<commit_message>
Updated Best-Team_presentation.pptx and Best-Team_poster.pdf
</commit_message>
<xml_diff>
--- a/Best-Team_presentation.pptx
+++ b/Best-Team_presentation.pptx
@@ -19,28 +19,30 @@
     <p:sldId id="264" r:id="rId14"/>
     <p:sldId id="265" r:id="rId15"/>
     <p:sldId id="266" r:id="rId16"/>
+    <p:sldId id="267" r:id="rId17"/>
+    <p:sldId id="268" r:id="rId18"/>
   </p:sldIdLst>
   <p:sldSz cy="5143500" cx="9144000"/>
   <p:notesSz cx="6858000" cy="9144000"/>
   <p:embeddedFontLst>
     <p:embeddedFont>
       <p:font typeface="Proxima Nova"/>
-      <p:regular r:id="rId17"/>
-      <p:bold r:id="rId18"/>
-      <p:italic r:id="rId19"/>
-      <p:boldItalic r:id="rId20"/>
+      <p:regular r:id="rId19"/>
+      <p:bold r:id="rId20"/>
+      <p:italic r:id="rId21"/>
+      <p:boldItalic r:id="rId22"/>
     </p:embeddedFont>
     <p:embeddedFont>
       <p:font typeface="Nunito"/>
-      <p:regular r:id="rId21"/>
-      <p:bold r:id="rId22"/>
-      <p:italic r:id="rId23"/>
-      <p:boldItalic r:id="rId24"/>
+      <p:regular r:id="rId23"/>
+      <p:bold r:id="rId24"/>
+      <p:italic r:id="rId25"/>
+      <p:boldItalic r:id="rId26"/>
     </p:embeddedFont>
     <p:embeddedFont>
       <p:font typeface="Maven Pro"/>
-      <p:regular r:id="rId25"/>
-      <p:bold r:id="rId26"/>
+      <p:regular r:id="rId27"/>
+      <p:bold r:id="rId28"/>
     </p:embeddedFont>
   </p:embeddedFontLst>
   <p:defaultTextStyle>
@@ -821,7 +823,7 @@
   <p:cSld>
     <p:spTree>
       <p:nvGrpSpPr>
-        <p:cNvPr id="326" name="Shape 326"/>
+        <p:cNvPr id="328" name="Shape 328"/>
         <p:cNvGrpSpPr/>
         <p:nvPr/>
       </p:nvGrpSpPr>
@@ -835,7 +837,7 @@
       </p:grpSpPr>
       <p:sp>
         <p:nvSpPr>
-          <p:cNvPr id="327" name="Google Shape;327;gaef3ee845b_1_0:notes"/>
+          <p:cNvPr id="329" name="Google Shape;329;gaef3ee845b_0_294:notes"/>
           <p:cNvSpPr/>
           <p:nvPr>
             <p:ph idx="2" type="sldImg"/>
@@ -870,7 +872,7 @@
       </p:sp>
       <p:sp>
         <p:nvSpPr>
-          <p:cNvPr id="328" name="Google Shape;328;gaef3ee845b_1_0:notes"/>
+          <p:cNvPr id="330" name="Google Shape;330;gaef3ee845b_0_294:notes"/>
           <p:cNvSpPr txBox="1"/>
           <p:nvPr>
             <p:ph idx="1" type="body"/>
@@ -920,7 +922,7 @@
   <p:cSld>
     <p:spTree>
       <p:nvGrpSpPr>
-        <p:cNvPr id="331" name="Shape 331"/>
+        <p:cNvPr id="334" name="Shape 334"/>
         <p:cNvGrpSpPr/>
         <p:nvPr/>
       </p:nvGrpSpPr>
@@ -934,7 +936,7 @@
       </p:grpSpPr>
       <p:sp>
         <p:nvSpPr>
-          <p:cNvPr id="332" name="Google Shape;332;gaef3ee845b_0_299:notes"/>
+          <p:cNvPr id="335" name="Google Shape;335;gae7831b4c5_0_7:notes"/>
           <p:cNvSpPr/>
           <p:nvPr>
             <p:ph idx="2" type="sldImg"/>
@@ -969,7 +971,205 @@
       </p:sp>
       <p:sp>
         <p:nvSpPr>
-          <p:cNvPr id="333" name="Google Shape;333;gaef3ee845b_0_299:notes"/>
+          <p:cNvPr id="336" name="Google Shape;336;gae7831b4c5_0_7:notes"/>
+          <p:cNvSpPr txBox="1"/>
+          <p:nvPr>
+            <p:ph idx="1" type="body"/>
+          </p:nvPr>
+        </p:nvSpPr>
+        <p:spPr>
+          <a:xfrm>
+            <a:off x="685800" y="4343400"/>
+            <a:ext cx="5486400" cy="4114800"/>
+          </a:xfrm>
+          <a:prstGeom prst="rect">
+            <a:avLst/>
+          </a:prstGeom>
+        </p:spPr>
+        <p:txBody>
+          <a:bodyPr anchorCtr="0" anchor="t" bIns="91425" lIns="91425" spcFirstLastPara="1" rIns="91425" wrap="square" tIns="91425">
+            <a:noAutofit/>
+          </a:bodyPr>
+          <a:lstStyle/>
+          <a:p>
+            <a:pPr indent="0" lvl="0" marL="0" rtl="0" algn="l">
+              <a:spcBef>
+                <a:spcPts val="0"/>
+              </a:spcBef>
+              <a:spcAft>
+                <a:spcPts val="0"/>
+              </a:spcAft>
+              <a:buNone/>
+            </a:pPr>
+            <a:r>
+              <a:t/>
+            </a:r>
+            <a:endParaRPr/>
+          </a:p>
+        </p:txBody>
+      </p:sp>
+    </p:spTree>
+  </p:cSld>
+  <p:clrMapOvr>
+    <a:masterClrMapping/>
+  </p:clrMapOvr>
+</p:notes>
+</file>
+
+<file path=ppt/notesSlides/notesSlide12.xml><?xml version="1.0" encoding="utf-8"?>
+<p:notes xmlns:a="http://schemas.openxmlformats.org/drawingml/2006/main" xmlns:r="http://schemas.openxmlformats.org/officeDocument/2006/relationships" xmlns:mc="http://schemas.openxmlformats.org/markup-compatibility/2006" xmlns:mv="urn:schemas-microsoft-com:mac:vml" xmlns:p="http://schemas.openxmlformats.org/presentationml/2006/main" xmlns:c="http://schemas.openxmlformats.org/drawingml/2006/chart" xmlns:dgm="http://schemas.openxmlformats.org/drawingml/2006/diagram" xmlns:o="urn:schemas-microsoft-com:office:office" xmlns:v="urn:schemas-microsoft-com:vml" xmlns:pvml="urn:schemas-microsoft-com:office:powerpoint" xmlns:com="http://schemas.openxmlformats.org/drawingml/2006/compatibility" xmlns:p14="http://schemas.microsoft.com/office/powerpoint/2010/main" xmlns:p15="http://schemas.microsoft.com/office/powerpoint/2012/main" xmlns:ahyp="http://schemas.microsoft.com/office/drawing/2018/hyperlinkcolor" showMasterPhAnim="0" showMasterSp="0">
+  <p:cSld>
+    <p:spTree>
+      <p:nvGrpSpPr>
+        <p:cNvPr id="340" name="Shape 340"/>
+        <p:cNvGrpSpPr/>
+        <p:nvPr/>
+      </p:nvGrpSpPr>
+      <p:grpSpPr>
+        <a:xfrm>
+          <a:off x="0" y="0"/>
+          <a:ext cx="0" cy="0"/>
+          <a:chOff x="0" y="0"/>
+          <a:chExt cx="0" cy="0"/>
+        </a:xfrm>
+      </p:grpSpPr>
+      <p:sp>
+        <p:nvSpPr>
+          <p:cNvPr id="341" name="Google Shape;341;gaef3ee845b_1_0:notes"/>
+          <p:cNvSpPr/>
+          <p:nvPr>
+            <p:ph idx="2" type="sldImg"/>
+          </p:nvPr>
+        </p:nvSpPr>
+        <p:spPr>
+          <a:xfrm>
+            <a:off x="381300" y="685800"/>
+            <a:ext cx="6096000" cy="3429000"/>
+          </a:xfrm>
+          <a:custGeom>
+            <a:rect b="b" l="l" r="r" t="t"/>
+            <a:pathLst>
+              <a:path extrusionOk="0" h="120000" w="120000">
+                <a:moveTo>
+                  <a:pt x="0" y="0"/>
+                </a:moveTo>
+                <a:lnTo>
+                  <a:pt x="120000" y="0"/>
+                </a:lnTo>
+                <a:lnTo>
+                  <a:pt x="120000" y="120000"/>
+                </a:lnTo>
+                <a:lnTo>
+                  <a:pt x="0" y="120000"/>
+                </a:lnTo>
+                <a:close/>
+              </a:path>
+            </a:pathLst>
+          </a:custGeom>
+        </p:spPr>
+      </p:sp>
+      <p:sp>
+        <p:nvSpPr>
+          <p:cNvPr id="342" name="Google Shape;342;gaef3ee845b_1_0:notes"/>
+          <p:cNvSpPr txBox="1"/>
+          <p:nvPr>
+            <p:ph idx="1" type="body"/>
+          </p:nvPr>
+        </p:nvSpPr>
+        <p:spPr>
+          <a:xfrm>
+            <a:off x="685800" y="4343400"/>
+            <a:ext cx="5486400" cy="4114800"/>
+          </a:xfrm>
+          <a:prstGeom prst="rect">
+            <a:avLst/>
+          </a:prstGeom>
+        </p:spPr>
+        <p:txBody>
+          <a:bodyPr anchorCtr="0" anchor="t" bIns="91425" lIns="91425" spcFirstLastPara="1" rIns="91425" wrap="square" tIns="91425">
+            <a:noAutofit/>
+          </a:bodyPr>
+          <a:lstStyle/>
+          <a:p>
+            <a:pPr indent="0" lvl="0" marL="0" rtl="0" algn="l">
+              <a:spcBef>
+                <a:spcPts val="0"/>
+              </a:spcBef>
+              <a:spcAft>
+                <a:spcPts val="0"/>
+              </a:spcAft>
+              <a:buNone/>
+            </a:pPr>
+            <a:r>
+              <a:t/>
+            </a:r>
+            <a:endParaRPr/>
+          </a:p>
+        </p:txBody>
+      </p:sp>
+    </p:spTree>
+  </p:cSld>
+  <p:clrMapOvr>
+    <a:masterClrMapping/>
+  </p:clrMapOvr>
+</p:notes>
+</file>
+
+<file path=ppt/notesSlides/notesSlide13.xml><?xml version="1.0" encoding="utf-8"?>
+<p:notes xmlns:a="http://schemas.openxmlformats.org/drawingml/2006/main" xmlns:r="http://schemas.openxmlformats.org/officeDocument/2006/relationships" xmlns:mc="http://schemas.openxmlformats.org/markup-compatibility/2006" xmlns:mv="urn:schemas-microsoft-com:mac:vml" xmlns:p="http://schemas.openxmlformats.org/presentationml/2006/main" xmlns:c="http://schemas.openxmlformats.org/drawingml/2006/chart" xmlns:dgm="http://schemas.openxmlformats.org/drawingml/2006/diagram" xmlns:o="urn:schemas-microsoft-com:office:office" xmlns:v="urn:schemas-microsoft-com:vml" xmlns:pvml="urn:schemas-microsoft-com:office:powerpoint" xmlns:com="http://schemas.openxmlformats.org/drawingml/2006/compatibility" xmlns:p14="http://schemas.microsoft.com/office/powerpoint/2010/main" xmlns:p15="http://schemas.microsoft.com/office/powerpoint/2012/main" xmlns:ahyp="http://schemas.microsoft.com/office/drawing/2018/hyperlinkcolor" showMasterPhAnim="0" showMasterSp="0">
+  <p:cSld>
+    <p:spTree>
+      <p:nvGrpSpPr>
+        <p:cNvPr id="345" name="Shape 345"/>
+        <p:cNvGrpSpPr/>
+        <p:nvPr/>
+      </p:nvGrpSpPr>
+      <p:grpSpPr>
+        <a:xfrm>
+          <a:off x="0" y="0"/>
+          <a:ext cx="0" cy="0"/>
+          <a:chOff x="0" y="0"/>
+          <a:chExt cx="0" cy="0"/>
+        </a:xfrm>
+      </p:grpSpPr>
+      <p:sp>
+        <p:nvSpPr>
+          <p:cNvPr id="346" name="Google Shape;346;gaef3ee845b_0_299:notes"/>
+          <p:cNvSpPr/>
+          <p:nvPr>
+            <p:ph idx="2" type="sldImg"/>
+          </p:nvPr>
+        </p:nvSpPr>
+        <p:spPr>
+          <a:xfrm>
+            <a:off x="381300" y="685800"/>
+            <a:ext cx="6096000" cy="3429000"/>
+          </a:xfrm>
+          <a:custGeom>
+            <a:rect b="b" l="l" r="r" t="t"/>
+            <a:pathLst>
+              <a:path extrusionOk="0" h="120000" w="120000">
+                <a:moveTo>
+                  <a:pt x="0" y="0"/>
+                </a:moveTo>
+                <a:lnTo>
+                  <a:pt x="120000" y="0"/>
+                </a:lnTo>
+                <a:lnTo>
+                  <a:pt x="120000" y="120000"/>
+                </a:lnTo>
+                <a:lnTo>
+                  <a:pt x="0" y="120000"/>
+                </a:lnTo>
+                <a:close/>
+              </a:path>
+            </a:pathLst>
+          </a:custGeom>
+        </p:spPr>
+      </p:sp>
+      <p:sp>
+        <p:nvSpPr>
+          <p:cNvPr id="347" name="Google Shape;347;gaef3ee845b_0_299:notes"/>
           <p:cNvSpPr txBox="1"/>
           <p:nvPr>
             <p:ph idx="1" type="body"/>
@@ -1033,7 +1233,7 @@
       </p:grpSpPr>
       <p:sp>
         <p:nvSpPr>
-          <p:cNvPr id="280" name="Google Shape;280;gaef3ee845b_0_268:notes"/>
+          <p:cNvPr id="280" name="Google Shape;280;gae7831b4c5_0_0:notes"/>
           <p:cNvSpPr/>
           <p:nvPr>
             <p:ph idx="2" type="sldImg"/>
@@ -1068,7 +1268,7 @@
       </p:sp>
       <p:sp>
         <p:nvSpPr>
-          <p:cNvPr id="281" name="Google Shape;281;gaef3ee845b_0_268:notes"/>
+          <p:cNvPr id="281" name="Google Shape;281;gae7831b4c5_0_0:notes"/>
           <p:cNvSpPr txBox="1"/>
           <p:nvPr>
             <p:ph idx="1" type="body"/>
@@ -1118,7 +1318,7 @@
   <p:cSld>
     <p:spTree>
       <p:nvGrpSpPr>
-        <p:cNvPr id="286" name="Shape 286"/>
+        <p:cNvPr id="287" name="Shape 287"/>
         <p:cNvGrpSpPr/>
         <p:nvPr/>
       </p:nvGrpSpPr>
@@ -1132,7 +1332,7 @@
       </p:grpSpPr>
       <p:sp>
         <p:nvSpPr>
-          <p:cNvPr id="287" name="Google Shape;287;gaef3ee845b_0_274:notes"/>
+          <p:cNvPr id="288" name="Google Shape;288;gaef3ee845b_0_268:notes"/>
           <p:cNvSpPr/>
           <p:nvPr>
             <p:ph idx="2" type="sldImg"/>
@@ -1167,7 +1367,7 @@
       </p:sp>
       <p:sp>
         <p:nvSpPr>
-          <p:cNvPr id="288" name="Google Shape;288;gaef3ee845b_0_274:notes"/>
+          <p:cNvPr id="289" name="Google Shape;289;gaef3ee845b_0_268:notes"/>
           <p:cNvSpPr txBox="1"/>
           <p:nvPr>
             <p:ph idx="1" type="body"/>
@@ -1217,7 +1417,7 @@
   <p:cSld>
     <p:spTree>
       <p:nvGrpSpPr>
-        <p:cNvPr id="292" name="Shape 292"/>
+        <p:cNvPr id="294" name="Shape 294"/>
         <p:cNvGrpSpPr/>
         <p:nvPr/>
       </p:nvGrpSpPr>
@@ -1231,7 +1431,7 @@
       </p:grpSpPr>
       <p:sp>
         <p:nvSpPr>
-          <p:cNvPr id="293" name="Google Shape;293;gaef3ee845b_0_279:notes"/>
+          <p:cNvPr id="295" name="Google Shape;295;gaef3ee845b_0_274:notes"/>
           <p:cNvSpPr/>
           <p:nvPr>
             <p:ph idx="2" type="sldImg"/>
@@ -1266,7 +1466,7 @@
       </p:sp>
       <p:sp>
         <p:nvSpPr>
-          <p:cNvPr id="294" name="Google Shape;294;gaef3ee845b_0_279:notes"/>
+          <p:cNvPr id="296" name="Google Shape;296;gaef3ee845b_0_274:notes"/>
           <p:cNvSpPr txBox="1"/>
           <p:nvPr>
             <p:ph idx="1" type="body"/>
@@ -1316,7 +1516,7 @@
   <p:cSld>
     <p:spTree>
       <p:nvGrpSpPr>
-        <p:cNvPr id="298" name="Shape 298"/>
+        <p:cNvPr id="300" name="Shape 300"/>
         <p:cNvGrpSpPr/>
         <p:nvPr/>
       </p:nvGrpSpPr>
@@ -1330,7 +1530,7 @@
       </p:grpSpPr>
       <p:sp>
         <p:nvSpPr>
-          <p:cNvPr id="299" name="Google Shape;299;gaef3ee845b_0_304:notes"/>
+          <p:cNvPr id="301" name="Google Shape;301;gaef3ee845b_0_279:notes"/>
           <p:cNvSpPr/>
           <p:nvPr>
             <p:ph idx="2" type="sldImg"/>
@@ -1365,7 +1565,7 @@
       </p:sp>
       <p:sp>
         <p:nvSpPr>
-          <p:cNvPr id="300" name="Google Shape;300;gaef3ee845b_0_304:notes"/>
+          <p:cNvPr id="302" name="Google Shape;302;gaef3ee845b_0_279:notes"/>
           <p:cNvSpPr txBox="1"/>
           <p:nvPr>
             <p:ph idx="1" type="body"/>
@@ -1415,7 +1615,7 @@
   <p:cSld>
     <p:spTree>
       <p:nvGrpSpPr>
-        <p:cNvPr id="304" name="Shape 304"/>
+        <p:cNvPr id="306" name="Shape 306"/>
         <p:cNvGrpSpPr/>
         <p:nvPr/>
       </p:nvGrpSpPr>
@@ -1429,7 +1629,7 @@
       </p:grpSpPr>
       <p:sp>
         <p:nvSpPr>
-          <p:cNvPr id="305" name="Google Shape;305;gaef3ee845b_0_309:notes"/>
+          <p:cNvPr id="307" name="Google Shape;307;gaef3ee845b_0_304:notes"/>
           <p:cNvSpPr/>
           <p:nvPr>
             <p:ph idx="2" type="sldImg"/>
@@ -1464,7 +1664,7 @@
       </p:sp>
       <p:sp>
         <p:nvSpPr>
-          <p:cNvPr id="306" name="Google Shape;306;gaef3ee845b_0_309:notes"/>
+          <p:cNvPr id="308" name="Google Shape;308;gaef3ee845b_0_304:notes"/>
           <p:cNvSpPr txBox="1"/>
           <p:nvPr>
             <p:ph idx="1" type="body"/>
@@ -1514,7 +1714,7 @@
   <p:cSld>
     <p:spTree>
       <p:nvGrpSpPr>
-        <p:cNvPr id="309" name="Shape 309"/>
+        <p:cNvPr id="312" name="Shape 312"/>
         <p:cNvGrpSpPr/>
         <p:nvPr/>
       </p:nvGrpSpPr>
@@ -1528,7 +1728,7 @@
       </p:grpSpPr>
       <p:sp>
         <p:nvSpPr>
-          <p:cNvPr id="310" name="Google Shape;310;gaef3ee845b_0_284:notes"/>
+          <p:cNvPr id="313" name="Google Shape;313;gaef3ee845b_0_309:notes"/>
           <p:cNvSpPr/>
           <p:nvPr>
             <p:ph idx="2" type="sldImg"/>
@@ -1563,7 +1763,7 @@
       </p:sp>
       <p:sp>
         <p:nvSpPr>
-          <p:cNvPr id="311" name="Google Shape;311;gaef3ee845b_0_284:notes"/>
+          <p:cNvPr id="314" name="Google Shape;314;gaef3ee845b_0_309:notes"/>
           <p:cNvSpPr txBox="1"/>
           <p:nvPr>
             <p:ph idx="1" type="body"/>
@@ -1613,7 +1813,7 @@
   <p:cSld>
     <p:spTree>
       <p:nvGrpSpPr>
-        <p:cNvPr id="315" name="Shape 315"/>
+        <p:cNvPr id="317" name="Shape 317"/>
         <p:cNvGrpSpPr/>
         <p:nvPr/>
       </p:nvGrpSpPr>
@@ -1627,7 +1827,7 @@
       </p:grpSpPr>
       <p:sp>
         <p:nvSpPr>
-          <p:cNvPr id="316" name="Google Shape;316;gaef3ee845b_0_289:notes"/>
+          <p:cNvPr id="318" name="Google Shape;318;gaef3ee845b_0_284:notes"/>
           <p:cNvSpPr/>
           <p:nvPr>
             <p:ph idx="2" type="sldImg"/>
@@ -1662,7 +1862,7 @@
       </p:sp>
       <p:sp>
         <p:nvSpPr>
-          <p:cNvPr id="317" name="Google Shape;317;gaef3ee845b_0_289:notes"/>
+          <p:cNvPr id="319" name="Google Shape;319;gaef3ee845b_0_284:notes"/>
           <p:cNvSpPr txBox="1"/>
           <p:nvPr>
             <p:ph idx="1" type="body"/>
@@ -1712,7 +1912,7 @@
   <p:cSld>
     <p:spTree>
       <p:nvGrpSpPr>
-        <p:cNvPr id="320" name="Shape 320"/>
+        <p:cNvPr id="323" name="Shape 323"/>
         <p:cNvGrpSpPr/>
         <p:nvPr/>
       </p:nvGrpSpPr>
@@ -1726,7 +1926,7 @@
       </p:grpSpPr>
       <p:sp>
         <p:nvSpPr>
-          <p:cNvPr id="321" name="Google Shape;321;gaef3ee845b_0_294:notes"/>
+          <p:cNvPr id="324" name="Google Shape;324;gaef3ee845b_0_289:notes"/>
           <p:cNvSpPr/>
           <p:nvPr>
             <p:ph idx="2" type="sldImg"/>
@@ -1761,7 +1961,7 @@
       </p:sp>
       <p:sp>
         <p:nvSpPr>
-          <p:cNvPr id="322" name="Google Shape;322;gaef3ee845b_0_294:notes"/>
+          <p:cNvPr id="325" name="Google Shape;325;gaef3ee845b_0_289:notes"/>
           <p:cNvSpPr txBox="1"/>
           <p:nvPr>
             <p:ph idx="1" type="body"/>
@@ -16203,7 +16403,7 @@
   <p:cSld>
     <p:spTree>
       <p:nvGrpSpPr>
-        <p:cNvPr id="329" name="Shape 329"/>
+        <p:cNvPr id="331" name="Shape 331"/>
         <p:cNvGrpSpPr/>
         <p:nvPr/>
       </p:nvGrpSpPr>
@@ -16217,7 +16417,500 @@
       </p:grpSpPr>
       <p:sp>
         <p:nvSpPr>
-          <p:cNvPr id="330" name="Google Shape;330;p22"/>
+          <p:cNvPr id="332" name="Google Shape;332;p22"/>
+          <p:cNvSpPr txBox="1"/>
+          <p:nvPr>
+            <p:ph type="title"/>
+          </p:nvPr>
+        </p:nvSpPr>
+        <p:spPr>
+          <a:xfrm>
+            <a:off x="1303800" y="598575"/>
+            <a:ext cx="7030500" cy="999300"/>
+          </a:xfrm>
+          <a:prstGeom prst="rect">
+            <a:avLst/>
+          </a:prstGeom>
+        </p:spPr>
+        <p:txBody>
+          <a:bodyPr anchorCtr="0" anchor="t" bIns="91425" lIns="91425" spcFirstLastPara="1" rIns="91425" wrap="square" tIns="91425">
+            <a:noAutofit/>
+          </a:bodyPr>
+          <a:lstStyle/>
+          <a:p>
+            <a:pPr indent="0" lvl="0" marL="0" rtl="0" algn="l">
+              <a:spcBef>
+                <a:spcPts val="0"/>
+              </a:spcBef>
+              <a:spcAft>
+                <a:spcPts val="0"/>
+              </a:spcAft>
+              <a:buNone/>
+            </a:pPr>
+            <a:r>
+              <a:rPr lang="en"/>
+              <a:t>Fault Injections</a:t>
+            </a:r>
+            <a:endParaRPr/>
+          </a:p>
+        </p:txBody>
+      </p:sp>
+      <p:sp>
+        <p:nvSpPr>
+          <p:cNvPr id="333" name="Google Shape;333;p22"/>
+          <p:cNvSpPr txBox="1"/>
+          <p:nvPr>
+            <p:ph idx="1" type="body"/>
+          </p:nvPr>
+        </p:nvSpPr>
+        <p:spPr>
+          <a:xfrm>
+            <a:off x="1303800" y="1990050"/>
+            <a:ext cx="7030500" cy="2541600"/>
+          </a:xfrm>
+          <a:prstGeom prst="rect">
+            <a:avLst/>
+          </a:prstGeom>
+        </p:spPr>
+        <p:txBody>
+          <a:bodyPr anchorCtr="0" anchor="t" bIns="91425" lIns="91425" spcFirstLastPara="1" rIns="91425" wrap="square" tIns="91425">
+            <a:noAutofit/>
+          </a:bodyPr>
+          <a:lstStyle/>
+          <a:p>
+            <a:pPr indent="-387350" lvl="0" marL="457200" rtl="0" algn="l">
+              <a:spcBef>
+                <a:spcPts val="0"/>
+              </a:spcBef>
+              <a:spcAft>
+                <a:spcPts val="0"/>
+              </a:spcAft>
+              <a:buSzPts val="2500"/>
+              <a:buChar char="-"/>
+            </a:pPr>
+            <a:r>
+              <a:rPr lang="en" sz="2500"/>
+              <a:t>Testing the tests</a:t>
+            </a:r>
+            <a:endParaRPr sz="2500"/>
+          </a:p>
+          <a:p>
+            <a:pPr indent="-387350" lvl="0" marL="457200" rtl="0" algn="l">
+              <a:spcBef>
+                <a:spcPts val="0"/>
+              </a:spcBef>
+              <a:spcAft>
+                <a:spcPts val="0"/>
+              </a:spcAft>
+              <a:buSzPts val="2500"/>
+              <a:buChar char="-"/>
+            </a:pPr>
+            <a:r>
+              <a:rPr lang="en" sz="2500"/>
+              <a:t>Necessary to demonstrate integrity</a:t>
+            </a:r>
+            <a:endParaRPr sz="2500"/>
+          </a:p>
+          <a:p>
+            <a:pPr indent="-387350" lvl="0" marL="457200" rtl="0" algn="l">
+              <a:spcBef>
+                <a:spcPts val="0"/>
+              </a:spcBef>
+              <a:spcAft>
+                <a:spcPts val="0"/>
+              </a:spcAft>
+              <a:buSzPts val="2500"/>
+              <a:buChar char="-"/>
+            </a:pPr>
+            <a:r>
+              <a:rPr lang="en" sz="2500"/>
+              <a:t>Catches more bugs</a:t>
+            </a:r>
+            <a:endParaRPr sz="2500"/>
+          </a:p>
+        </p:txBody>
+      </p:sp>
+    </p:spTree>
+  </p:cSld>
+  <p:clrMapOvr>
+    <a:masterClrMapping/>
+  </p:clrMapOvr>
+</p:sld>
+</file>
+
+<file path=ppt/slides/slide11.xml><?xml version="1.0" encoding="utf-8"?>
+<p:sld xmlns:a="http://schemas.openxmlformats.org/drawingml/2006/main" xmlns:r="http://schemas.openxmlformats.org/officeDocument/2006/relationships" xmlns:mc="http://schemas.openxmlformats.org/markup-compatibility/2006" xmlns:mv="urn:schemas-microsoft-com:mac:vml" xmlns:p="http://schemas.openxmlformats.org/presentationml/2006/main" xmlns:c="http://schemas.openxmlformats.org/drawingml/2006/chart" xmlns:dgm="http://schemas.openxmlformats.org/drawingml/2006/diagram" xmlns:o="urn:schemas-microsoft-com:office:office" xmlns:v="urn:schemas-microsoft-com:vml" xmlns:pvml="urn:schemas-microsoft-com:office:powerpoint" xmlns:com="http://schemas.openxmlformats.org/drawingml/2006/compatibility" xmlns:p14="http://schemas.microsoft.com/office/powerpoint/2010/main" xmlns:p15="http://schemas.microsoft.com/office/powerpoint/2012/main" xmlns:ahyp="http://schemas.microsoft.com/office/drawing/2018/hyperlinkcolor">
+  <p:cSld>
+    <p:spTree>
+      <p:nvGrpSpPr>
+        <p:cNvPr id="337" name="Shape 337"/>
+        <p:cNvGrpSpPr/>
+        <p:nvPr/>
+      </p:nvGrpSpPr>
+      <p:grpSpPr>
+        <a:xfrm>
+          <a:off x="0" y="0"/>
+          <a:ext cx="0" cy="0"/>
+          <a:chOff x="0" y="0"/>
+          <a:chExt cx="0" cy="0"/>
+        </a:xfrm>
+      </p:grpSpPr>
+      <p:sp>
+        <p:nvSpPr>
+          <p:cNvPr id="338" name="Google Shape;338;p23"/>
+          <p:cNvSpPr txBox="1"/>
+          <p:nvPr>
+            <p:ph type="title"/>
+          </p:nvPr>
+        </p:nvSpPr>
+        <p:spPr>
+          <a:xfrm>
+            <a:off x="1303800" y="598575"/>
+            <a:ext cx="7030500" cy="999300"/>
+          </a:xfrm>
+          <a:prstGeom prst="rect">
+            <a:avLst/>
+          </a:prstGeom>
+        </p:spPr>
+        <p:txBody>
+          <a:bodyPr anchorCtr="0" anchor="t" bIns="91425" lIns="91425" spcFirstLastPara="1" rIns="91425" wrap="square" tIns="91425">
+            <a:noAutofit/>
+          </a:bodyPr>
+          <a:lstStyle/>
+          <a:p>
+            <a:pPr indent="0" lvl="0" marL="0" rtl="0" algn="l">
+              <a:spcBef>
+                <a:spcPts val="0"/>
+              </a:spcBef>
+              <a:spcAft>
+                <a:spcPts val="0"/>
+              </a:spcAft>
+              <a:buNone/>
+            </a:pPr>
+            <a:r>
+              <a:rPr lang="en"/>
+              <a:t>What did we change?</a:t>
+            </a:r>
+            <a:endParaRPr/>
+          </a:p>
+        </p:txBody>
+      </p:sp>
+      <p:sp>
+        <p:nvSpPr>
+          <p:cNvPr id="339" name="Google Shape;339;p23"/>
+          <p:cNvSpPr txBox="1"/>
+          <p:nvPr>
+            <p:ph idx="1" type="body"/>
+          </p:nvPr>
+        </p:nvSpPr>
+        <p:spPr>
+          <a:xfrm>
+            <a:off x="1303800" y="1597875"/>
+            <a:ext cx="7030500" cy="2541600"/>
+          </a:xfrm>
+          <a:prstGeom prst="rect">
+            <a:avLst/>
+          </a:prstGeom>
+        </p:spPr>
+        <p:txBody>
+          <a:bodyPr anchorCtr="0" anchor="t" bIns="91425" lIns="91425" spcFirstLastPara="1" rIns="91425" wrap="square" tIns="91425">
+            <a:noAutofit/>
+          </a:bodyPr>
+          <a:lstStyle/>
+          <a:p>
+            <a:pPr indent="0" lvl="0" marL="0" rtl="0" algn="l">
+              <a:lnSpc>
+                <a:spcPct val="125000"/>
+              </a:lnSpc>
+              <a:spcBef>
+                <a:spcPts val="1800"/>
+              </a:spcBef>
+              <a:spcAft>
+                <a:spcPts val="0"/>
+              </a:spcAft>
+              <a:buNone/>
+            </a:pPr>
+            <a:r>
+              <a:rPr b="1" lang="en" sz="1200">
+                <a:solidFill>
+                  <a:srgbClr val="24292E"/>
+                </a:solidFill>
+                <a:highlight>
+                  <a:srgbClr val="FFFFFF"/>
+                </a:highlight>
+              </a:rPr>
+              <a:t>Fault 1: Dropdown entWithContent: </a:t>
+            </a:r>
+            <a:r>
+              <a:rPr lang="en" sz="1200">
+                <a:solidFill>
+                  <a:srgbClr val="24292E"/>
+                </a:solidFill>
+                <a:highlight>
+                  <a:srgbClr val="FFFFFF"/>
+                </a:highlight>
+              </a:rPr>
+              <a:t> "!==" in the second if statement was changed to "==="</a:t>
+            </a:r>
+            <a:endParaRPr sz="1200">
+              <a:solidFill>
+                <a:srgbClr val="24292E"/>
+              </a:solidFill>
+              <a:highlight>
+                <a:srgbClr val="FFFFFF"/>
+              </a:highlight>
+            </a:endParaRPr>
+          </a:p>
+          <a:p>
+            <a:pPr indent="0" lvl="0" marL="0" rtl="0" algn="l">
+              <a:lnSpc>
+                <a:spcPct val="125000"/>
+              </a:lnSpc>
+              <a:spcBef>
+                <a:spcPts val="1800"/>
+              </a:spcBef>
+              <a:spcAft>
+                <a:spcPts val="0"/>
+              </a:spcAft>
+              <a:buNone/>
+            </a:pPr>
+            <a:r>
+              <a:rPr b="1" lang="en" sz="1200">
+                <a:solidFill>
+                  <a:srgbClr val="24292E"/>
+                </a:solidFill>
+                <a:highlight>
+                  <a:srgbClr val="FFFFFF"/>
+                </a:highlight>
+              </a:rPr>
+              <a:t>Fault 2: CardList typeField: </a:t>
+            </a:r>
+            <a:r>
+              <a:rPr lang="en" sz="1200">
+                <a:solidFill>
+                  <a:srgbClr val="24292E"/>
+                </a:solidFill>
+                <a:highlight>
+                  <a:srgbClr val="FFFFFF"/>
+                </a:highlight>
+              </a:rPr>
+              <a:t>"else if (numbers.test(f) === true)" was replaced with "else if (numbers.test(f) !== true)"</a:t>
+            </a:r>
+            <a:endParaRPr b="1" sz="1200">
+              <a:solidFill>
+                <a:srgbClr val="24292E"/>
+              </a:solidFill>
+              <a:highlight>
+                <a:srgbClr val="FFFFFF"/>
+              </a:highlight>
+            </a:endParaRPr>
+          </a:p>
+          <a:p>
+            <a:pPr indent="0" lvl="0" marL="0" rtl="0" algn="l">
+              <a:lnSpc>
+                <a:spcPct val="125000"/>
+              </a:lnSpc>
+              <a:spcBef>
+                <a:spcPts val="1800"/>
+              </a:spcBef>
+              <a:spcAft>
+                <a:spcPts val="0"/>
+              </a:spcAft>
+              <a:buNone/>
+            </a:pPr>
+            <a:r>
+              <a:rPr b="1" lang="en" sz="1200">
+                <a:solidFill>
+                  <a:srgbClr val="24292E"/>
+                </a:solidFill>
+                <a:highlight>
+                  <a:srgbClr val="FFFFFF"/>
+                </a:highlight>
+              </a:rPr>
+              <a:t>Fault 3: FieldCard lengthCheckedValue: </a:t>
+            </a:r>
+            <a:r>
+              <a:rPr lang="en" sz="1200">
+                <a:solidFill>
+                  <a:srgbClr val="24292E"/>
+                </a:solidFill>
+                <a:highlight>
+                  <a:srgbClr val="FFFFFF"/>
+                </a:highlight>
+              </a:rPr>
+              <a:t>"else if (value.length &gt; 25)" was changed to "else if (value.length &lt; 25)"</a:t>
+            </a:r>
+            <a:endParaRPr b="1" sz="1200">
+              <a:solidFill>
+                <a:srgbClr val="24292E"/>
+              </a:solidFill>
+              <a:highlight>
+                <a:srgbClr val="FFFFFF"/>
+              </a:highlight>
+            </a:endParaRPr>
+          </a:p>
+          <a:p>
+            <a:pPr indent="0" lvl="0" marL="0" rtl="0" algn="l">
+              <a:lnSpc>
+                <a:spcPct val="125000"/>
+              </a:lnSpc>
+              <a:spcBef>
+                <a:spcPts val="1800"/>
+              </a:spcBef>
+              <a:spcAft>
+                <a:spcPts val="0"/>
+              </a:spcAft>
+              <a:buNone/>
+            </a:pPr>
+            <a:r>
+              <a:rPr b="1" lang="en" sz="1200">
+                <a:solidFill>
+                  <a:srgbClr val="24292E"/>
+                </a:solidFill>
+                <a:highlight>
+                  <a:srgbClr val="FFFFFF"/>
+                </a:highlight>
+              </a:rPr>
+              <a:t>Fault 4: App findDuplicates: </a:t>
+            </a:r>
+            <a:r>
+              <a:rPr lang="en" sz="1200">
+                <a:solidFill>
+                  <a:srgbClr val="24292E"/>
+                </a:solidFill>
+                <a:highlight>
+                  <a:srgbClr val="FFFFFF"/>
+                </a:highlight>
+              </a:rPr>
+              <a:t>"(names[i] === names[j])" was changed to if "(names[i] !== names[j])"</a:t>
+            </a:r>
+            <a:endParaRPr b="1" sz="1200">
+              <a:solidFill>
+                <a:srgbClr val="24292E"/>
+              </a:solidFill>
+              <a:highlight>
+                <a:srgbClr val="FFFFFF"/>
+              </a:highlight>
+            </a:endParaRPr>
+          </a:p>
+          <a:p>
+            <a:pPr indent="0" lvl="0" marL="0" rtl="0" algn="l">
+              <a:lnSpc>
+                <a:spcPct val="125000"/>
+              </a:lnSpc>
+              <a:spcBef>
+                <a:spcPts val="1800"/>
+              </a:spcBef>
+              <a:spcAft>
+                <a:spcPts val="0"/>
+              </a:spcAft>
+              <a:buNone/>
+            </a:pPr>
+            <a:r>
+              <a:rPr b="1" lang="en" sz="1200">
+                <a:solidFill>
+                  <a:srgbClr val="24292E"/>
+                </a:solidFill>
+                <a:highlight>
+                  <a:srgbClr val="FFFFFF"/>
+                </a:highlight>
+              </a:rPr>
+              <a:t>Fault 5: FieldCard isMetaDataAddCard: </a:t>
+            </a:r>
+            <a:r>
+              <a:rPr lang="en" sz="1200">
+                <a:solidFill>
+                  <a:srgbClr val="24292E"/>
+                </a:solidFill>
+                <a:highlight>
+                  <a:srgbClr val="FFFFFF"/>
+                </a:highlight>
+              </a:rPr>
+              <a:t>"let totalAddedCards = 4" was changed to "let totalAddedCards = 2"</a:t>
+            </a:r>
+            <a:endParaRPr b="1" sz="1200">
+              <a:solidFill>
+                <a:srgbClr val="24292E"/>
+              </a:solidFill>
+              <a:highlight>
+                <a:srgbClr val="FFFFFF"/>
+              </a:highlight>
+            </a:endParaRPr>
+          </a:p>
+          <a:p>
+            <a:pPr indent="0" lvl="0" marL="0" rtl="0" algn="l">
+              <a:lnSpc>
+                <a:spcPct val="125000"/>
+              </a:lnSpc>
+              <a:spcBef>
+                <a:spcPts val="1800"/>
+              </a:spcBef>
+              <a:spcAft>
+                <a:spcPts val="0"/>
+              </a:spcAft>
+              <a:buNone/>
+            </a:pPr>
+            <a:r>
+              <a:t/>
+            </a:r>
+            <a:endParaRPr b="1" sz="1650">
+              <a:solidFill>
+                <a:srgbClr val="24292E"/>
+              </a:solidFill>
+              <a:highlight>
+                <a:srgbClr val="FFFFFF"/>
+              </a:highlight>
+              <a:latin typeface="Arial"/>
+              <a:ea typeface="Arial"/>
+              <a:cs typeface="Arial"/>
+              <a:sym typeface="Arial"/>
+            </a:endParaRPr>
+          </a:p>
+          <a:p>
+            <a:pPr indent="0" lvl="0" marL="0" rtl="0" algn="l">
+              <a:spcBef>
+                <a:spcPts val="1200"/>
+              </a:spcBef>
+              <a:spcAft>
+                <a:spcPts val="1600"/>
+              </a:spcAft>
+              <a:buNone/>
+            </a:pPr>
+            <a:r>
+              <a:t/>
+            </a:r>
+            <a:endParaRPr/>
+          </a:p>
+        </p:txBody>
+      </p:sp>
+    </p:spTree>
+  </p:cSld>
+  <p:clrMapOvr>
+    <a:masterClrMapping/>
+  </p:clrMapOvr>
+</p:sld>
+</file>
+
+<file path=ppt/slides/slide12.xml><?xml version="1.0" encoding="utf-8"?>
+<p:sld xmlns:a="http://schemas.openxmlformats.org/drawingml/2006/main" xmlns:r="http://schemas.openxmlformats.org/officeDocument/2006/relationships" xmlns:mc="http://schemas.openxmlformats.org/markup-compatibility/2006" xmlns:mv="urn:schemas-microsoft-com:mac:vml" xmlns:p="http://schemas.openxmlformats.org/presentationml/2006/main" xmlns:c="http://schemas.openxmlformats.org/drawingml/2006/chart" xmlns:dgm="http://schemas.openxmlformats.org/drawingml/2006/diagram" xmlns:o="urn:schemas-microsoft-com:office:office" xmlns:v="urn:schemas-microsoft-com:vml" xmlns:pvml="urn:schemas-microsoft-com:office:powerpoint" xmlns:com="http://schemas.openxmlformats.org/drawingml/2006/compatibility" xmlns:p14="http://schemas.microsoft.com/office/powerpoint/2010/main" xmlns:p15="http://schemas.microsoft.com/office/powerpoint/2012/main" xmlns:ahyp="http://schemas.microsoft.com/office/drawing/2018/hyperlinkcolor">
+  <p:cSld>
+    <p:spTree>
+      <p:nvGrpSpPr>
+        <p:cNvPr id="343" name="Shape 343"/>
+        <p:cNvGrpSpPr/>
+        <p:nvPr/>
+      </p:nvGrpSpPr>
+      <p:grpSpPr>
+        <a:xfrm>
+          <a:off x="0" y="0"/>
+          <a:ext cx="0" cy="0"/>
+          <a:chOff x="0" y="0"/>
+          <a:chExt cx="0" cy="0"/>
+        </a:xfrm>
+      </p:grpSpPr>
+      <p:sp>
+        <p:nvSpPr>
+          <p:cNvPr id="344" name="Google Shape;344;p24"/>
           <p:cNvSpPr txBox="1"/>
           <p:nvPr>
             <p:ph type="title"/>
@@ -16263,12 +16956,12 @@
 </p:sld>
 </file>
 
-<file path=ppt/slides/slide11.xml><?xml version="1.0" encoding="utf-8"?>
+<file path=ppt/slides/slide13.xml><?xml version="1.0" encoding="utf-8"?>
 <p:sld xmlns:a="http://schemas.openxmlformats.org/drawingml/2006/main" xmlns:r="http://schemas.openxmlformats.org/officeDocument/2006/relationships" xmlns:mc="http://schemas.openxmlformats.org/markup-compatibility/2006" xmlns:mv="urn:schemas-microsoft-com:mac:vml" xmlns:p="http://schemas.openxmlformats.org/presentationml/2006/main" xmlns:c="http://schemas.openxmlformats.org/drawingml/2006/chart" xmlns:dgm="http://schemas.openxmlformats.org/drawingml/2006/diagram" xmlns:o="urn:schemas-microsoft-com:office:office" xmlns:v="urn:schemas-microsoft-com:vml" xmlns:pvml="urn:schemas-microsoft-com:office:powerpoint" xmlns:com="http://schemas.openxmlformats.org/drawingml/2006/compatibility" xmlns:p14="http://schemas.microsoft.com/office/powerpoint/2010/main" xmlns:p15="http://schemas.microsoft.com/office/powerpoint/2012/main" xmlns:ahyp="http://schemas.microsoft.com/office/drawing/2018/hyperlinkcolor">
   <p:cSld>
     <p:spTree>
       <p:nvGrpSpPr>
-        <p:cNvPr id="334" name="Shape 334"/>
+        <p:cNvPr id="348" name="Shape 348"/>
         <p:cNvGrpSpPr/>
         <p:nvPr/>
       </p:nvGrpSpPr>
@@ -16282,7 +16975,7 @@
       </p:grpSpPr>
       <p:sp>
         <p:nvSpPr>
-          <p:cNvPr id="335" name="Google Shape;335;p23"/>
+          <p:cNvPr id="349" name="Google Shape;349;p25"/>
           <p:cNvSpPr txBox="1"/>
           <p:nvPr>
             <p:ph type="title"/>
@@ -16322,7 +17015,7 @@
       </p:sp>
       <p:sp>
         <p:nvSpPr>
-          <p:cNvPr id="336" name="Google Shape;336;p23"/>
+          <p:cNvPr id="350" name="Google Shape;350;p25"/>
           <p:cNvSpPr txBox="1"/>
           <p:nvPr>
             <p:ph idx="1" type="body"/>
@@ -16456,13 +17149,477 @@
               <a:rPr lang="en" sz="3200"/>
               <a:t>Introduction to Best Team</a:t>
             </a:r>
+            <a:endParaRPr/>
+          </a:p>
+        </p:txBody>
+      </p:sp>
+      <p:sp>
+        <p:nvSpPr>
+          <p:cNvPr id="284" name="Google Shape;284;p14"/>
+          <p:cNvSpPr txBox="1"/>
+          <p:nvPr>
+            <p:ph idx="1" type="body"/>
+          </p:nvPr>
+        </p:nvSpPr>
+        <p:spPr>
+          <a:xfrm>
+            <a:off x="990300" y="1794375"/>
+            <a:ext cx="1889100" cy="2541600"/>
+          </a:xfrm>
+          <a:prstGeom prst="rect">
+            <a:avLst/>
+          </a:prstGeom>
+        </p:spPr>
+        <p:txBody>
+          <a:bodyPr anchorCtr="0" anchor="t" bIns="91425" lIns="91425" spcFirstLastPara="1" rIns="91425" wrap="square" tIns="91425">
+            <a:noAutofit/>
+          </a:bodyPr>
+          <a:lstStyle/>
+          <a:p>
+            <a:pPr indent="0" lvl="0" marL="0" rtl="0" algn="l">
+              <a:spcBef>
+                <a:spcPts val="0"/>
+              </a:spcBef>
+              <a:spcAft>
+                <a:spcPts val="0"/>
+              </a:spcAft>
+              <a:buNone/>
+            </a:pPr>
+            <a:r>
+              <a:rPr b="1" lang="en" sz="1400"/>
+              <a:t>Seth Hinson</a:t>
+            </a:r>
+            <a:endParaRPr b="1" sz="1400"/>
+          </a:p>
+          <a:p>
+            <a:pPr indent="0" lvl="0" marL="0" rtl="0" algn="l">
+              <a:spcBef>
+                <a:spcPts val="1600"/>
+              </a:spcBef>
+              <a:spcAft>
+                <a:spcPts val="0"/>
+              </a:spcAft>
+              <a:buNone/>
+            </a:pPr>
+            <a:r>
+              <a:rPr lang="en" sz="1000"/>
+              <a:t>Class: </a:t>
+            </a:r>
+            <a:r>
+              <a:rPr lang="en" sz="1000"/>
+              <a:t>Senior</a:t>
+            </a:r>
+            <a:endParaRPr sz="1000"/>
+          </a:p>
+          <a:p>
+            <a:pPr indent="0" lvl="0" marL="0" rtl="0" algn="l">
+              <a:spcBef>
+                <a:spcPts val="1600"/>
+              </a:spcBef>
+              <a:spcAft>
+                <a:spcPts val="0"/>
+              </a:spcAft>
+              <a:buNone/>
+            </a:pPr>
+            <a:r>
+              <a:rPr lang="en" sz="1000"/>
+              <a:t>Major(s): Computer Science</a:t>
+            </a:r>
+            <a:endParaRPr sz="1000"/>
+          </a:p>
+          <a:p>
+            <a:pPr indent="0" lvl="0" marL="0" rtl="0" algn="l">
+              <a:spcBef>
+                <a:spcPts val="1600"/>
+              </a:spcBef>
+              <a:spcAft>
+                <a:spcPts val="0"/>
+              </a:spcAft>
+              <a:buNone/>
+            </a:pPr>
+            <a:r>
+              <a:rPr lang="en" sz="1000"/>
+              <a:t>Minor(s): Data Science and Russian Studies</a:t>
+            </a:r>
+            <a:endParaRPr sz="1000"/>
+          </a:p>
+          <a:p>
+            <a:pPr indent="0" lvl="0" marL="0" rtl="0" algn="l">
+              <a:spcBef>
+                <a:spcPts val="1600"/>
+              </a:spcBef>
+              <a:spcAft>
+                <a:spcPts val="0"/>
+              </a:spcAft>
+              <a:buNone/>
+            </a:pPr>
+            <a:r>
+              <a:rPr lang="en" sz="1000"/>
+              <a:t>Extra </a:t>
+            </a:r>
+            <a:r>
+              <a:rPr lang="en" sz="1000"/>
+              <a:t>curriculars: Cyber Security Club, Student Network Engineer with CofC IT</a:t>
+            </a:r>
+            <a:endParaRPr sz="1000"/>
+          </a:p>
+          <a:p>
+            <a:pPr indent="0" lvl="0" marL="0" rtl="0" algn="l">
+              <a:spcBef>
+                <a:spcPts val="1600"/>
+              </a:spcBef>
+              <a:spcAft>
+                <a:spcPts val="0"/>
+              </a:spcAft>
+              <a:buNone/>
+            </a:pPr>
+            <a:r>
+              <a:rPr lang="en" sz="1000"/>
+              <a:t>Main Role: Team Lead</a:t>
+            </a:r>
+            <a:endParaRPr sz="1000"/>
+          </a:p>
+          <a:p>
+            <a:pPr indent="0" lvl="0" marL="0" rtl="0" algn="l">
+              <a:spcBef>
+                <a:spcPts val="1600"/>
+              </a:spcBef>
+              <a:spcAft>
+                <a:spcPts val="1600"/>
+              </a:spcAft>
+              <a:buNone/>
+            </a:pPr>
+            <a:r>
+              <a:rPr lang="en" sz="700"/>
+              <a:t> </a:t>
+            </a:r>
+            <a:endParaRPr sz="700"/>
+          </a:p>
+        </p:txBody>
+      </p:sp>
+      <p:sp>
+        <p:nvSpPr>
+          <p:cNvPr id="285" name="Google Shape;285;p14"/>
+          <p:cNvSpPr txBox="1"/>
+          <p:nvPr>
+            <p:ph idx="1" type="body"/>
+          </p:nvPr>
+        </p:nvSpPr>
+        <p:spPr>
+          <a:xfrm>
+            <a:off x="3602400" y="1794375"/>
+            <a:ext cx="1939200" cy="2541600"/>
+          </a:xfrm>
+          <a:prstGeom prst="rect">
+            <a:avLst/>
+          </a:prstGeom>
+        </p:spPr>
+        <p:txBody>
+          <a:bodyPr anchorCtr="0" anchor="t" bIns="91425" lIns="91425" spcFirstLastPara="1" rIns="91425" wrap="square" tIns="91425">
+            <a:noAutofit/>
+          </a:bodyPr>
+          <a:lstStyle/>
+          <a:p>
+            <a:pPr indent="0" lvl="0" marL="0" rtl="0" algn="l">
+              <a:spcBef>
+                <a:spcPts val="0"/>
+              </a:spcBef>
+              <a:spcAft>
+                <a:spcPts val="0"/>
+              </a:spcAft>
+              <a:buNone/>
+            </a:pPr>
+            <a:r>
+              <a:rPr b="1" lang="en" sz="1400"/>
+              <a:t>Cormac Conahan</a:t>
+            </a:r>
+            <a:endParaRPr b="1" sz="1400"/>
+          </a:p>
+          <a:p>
+            <a:pPr indent="0" lvl="0" marL="0" rtl="0" algn="l">
+              <a:spcBef>
+                <a:spcPts val="1600"/>
+              </a:spcBef>
+              <a:spcAft>
+                <a:spcPts val="0"/>
+              </a:spcAft>
+              <a:buNone/>
+            </a:pPr>
+            <a:r>
+              <a:rPr lang="en" sz="1000"/>
+              <a:t>Class: Junior</a:t>
+            </a:r>
+            <a:endParaRPr sz="1000"/>
+          </a:p>
+          <a:p>
+            <a:pPr indent="0" lvl="0" marL="0" rtl="0" algn="l">
+              <a:spcBef>
+                <a:spcPts val="1600"/>
+              </a:spcBef>
+              <a:spcAft>
+                <a:spcPts val="0"/>
+              </a:spcAft>
+              <a:buNone/>
+            </a:pPr>
+            <a:r>
+              <a:rPr lang="en" sz="1000"/>
+              <a:t>Major(s): Computer Science</a:t>
+            </a:r>
+            <a:endParaRPr sz="1000"/>
+          </a:p>
+          <a:p>
+            <a:pPr indent="0" lvl="0" marL="0" rtl="0" algn="l">
+              <a:spcBef>
+                <a:spcPts val="1600"/>
+              </a:spcBef>
+              <a:spcAft>
+                <a:spcPts val="0"/>
+              </a:spcAft>
+              <a:buNone/>
+            </a:pPr>
+            <a:r>
+              <a:rPr lang="en" sz="1000"/>
+              <a:t>Minor(s): Math</a:t>
+            </a:r>
+            <a:endParaRPr sz="1000"/>
+          </a:p>
+          <a:p>
+            <a:pPr indent="0" lvl="0" marL="0" rtl="0" algn="l">
+              <a:spcBef>
+                <a:spcPts val="1600"/>
+              </a:spcBef>
+              <a:spcAft>
+                <a:spcPts val="0"/>
+              </a:spcAft>
+              <a:buNone/>
+            </a:pPr>
+            <a:r>
+              <a:rPr lang="en" sz="1000"/>
+              <a:t>Extra curriculars: Rock Climbing</a:t>
+            </a:r>
+            <a:endParaRPr sz="1000"/>
+          </a:p>
+          <a:p>
+            <a:pPr indent="0" lvl="0" marL="0" rtl="0" algn="l">
+              <a:spcBef>
+                <a:spcPts val="1600"/>
+              </a:spcBef>
+              <a:spcAft>
+                <a:spcPts val="1600"/>
+              </a:spcAft>
+              <a:buNone/>
+            </a:pPr>
+            <a:r>
+              <a:rPr lang="en" sz="1000"/>
+              <a:t>Main Role: Scribe</a:t>
+            </a:r>
+            <a:endParaRPr sz="1000"/>
+          </a:p>
+        </p:txBody>
+      </p:sp>
+      <p:sp>
+        <p:nvSpPr>
+          <p:cNvPr id="286" name="Google Shape;286;p14"/>
+          <p:cNvSpPr txBox="1"/>
+          <p:nvPr>
+            <p:ph idx="1" type="body"/>
+          </p:nvPr>
+        </p:nvSpPr>
+        <p:spPr>
+          <a:xfrm>
+            <a:off x="6264600" y="1794375"/>
+            <a:ext cx="2069700" cy="2541600"/>
+          </a:xfrm>
+          <a:prstGeom prst="rect">
+            <a:avLst/>
+          </a:prstGeom>
+        </p:spPr>
+        <p:txBody>
+          <a:bodyPr anchorCtr="0" anchor="t" bIns="91425" lIns="91425" spcFirstLastPara="1" rIns="91425" wrap="square" tIns="91425">
+            <a:noAutofit/>
+          </a:bodyPr>
+          <a:lstStyle/>
+          <a:p>
+            <a:pPr indent="0" lvl="0" marL="0" rtl="0" algn="l">
+              <a:spcBef>
+                <a:spcPts val="0"/>
+              </a:spcBef>
+              <a:spcAft>
+                <a:spcPts val="0"/>
+              </a:spcAft>
+              <a:buNone/>
+            </a:pPr>
+            <a:r>
+              <a:rPr b="1" lang="en" sz="1400"/>
+              <a:t>Robert Niggebrugge</a:t>
+            </a:r>
+            <a:endParaRPr b="1" sz="1400"/>
+          </a:p>
+          <a:p>
+            <a:pPr indent="0" lvl="0" marL="0" rtl="0" algn="l">
+              <a:spcBef>
+                <a:spcPts val="1600"/>
+              </a:spcBef>
+              <a:spcAft>
+                <a:spcPts val="0"/>
+              </a:spcAft>
+              <a:buNone/>
+            </a:pPr>
+            <a:r>
+              <a:rPr lang="en" sz="1000"/>
+              <a:t>Class: Senior</a:t>
+            </a:r>
+            <a:endParaRPr sz="1000"/>
+          </a:p>
+          <a:p>
+            <a:pPr indent="0" lvl="0" marL="0" rtl="0" algn="l">
+              <a:spcBef>
+                <a:spcPts val="1600"/>
+              </a:spcBef>
+              <a:spcAft>
+                <a:spcPts val="0"/>
+              </a:spcAft>
+              <a:buNone/>
+            </a:pPr>
+            <a:r>
+              <a:rPr lang="en" sz="1000"/>
+              <a:t>Major(s): Computer Science</a:t>
+            </a:r>
+            <a:endParaRPr sz="1000"/>
+          </a:p>
+          <a:p>
+            <a:pPr indent="0" lvl="0" marL="0" rtl="0" algn="l">
+              <a:spcBef>
+                <a:spcPts val="1600"/>
+              </a:spcBef>
+              <a:spcAft>
+                <a:spcPts val="0"/>
+              </a:spcAft>
+              <a:buNone/>
+            </a:pPr>
+            <a:r>
+              <a:rPr lang="en" sz="1000"/>
+              <a:t>Minor(s): Data Science</a:t>
+            </a:r>
+            <a:endParaRPr sz="1000"/>
+          </a:p>
+          <a:p>
+            <a:pPr indent="0" lvl="0" marL="0" rtl="0" algn="l">
+              <a:spcBef>
+                <a:spcPts val="1600"/>
+              </a:spcBef>
+              <a:spcAft>
+                <a:spcPts val="0"/>
+              </a:spcAft>
+              <a:buNone/>
+            </a:pPr>
+            <a:r>
+              <a:rPr lang="en" sz="1000"/>
+              <a:t>Extra curriculars: CIRDLES, ACM</a:t>
+            </a:r>
+            <a:endParaRPr sz="1000"/>
+          </a:p>
+          <a:p>
+            <a:pPr indent="0" lvl="0" marL="0" rtl="0" algn="l">
+              <a:spcBef>
+                <a:spcPts val="1600"/>
+              </a:spcBef>
+              <a:spcAft>
+                <a:spcPts val="0"/>
+              </a:spcAft>
+              <a:buNone/>
+            </a:pPr>
+            <a:r>
+              <a:rPr lang="en" sz="1000"/>
+              <a:t>Main Role: Technical Lead</a:t>
+            </a:r>
+            <a:endParaRPr sz="1000"/>
+          </a:p>
+          <a:p>
+            <a:pPr indent="0" lvl="0" marL="0" rtl="0" algn="l">
+              <a:spcBef>
+                <a:spcPts val="1600"/>
+              </a:spcBef>
+              <a:spcAft>
+                <a:spcPts val="1600"/>
+              </a:spcAft>
+              <a:buNone/>
+            </a:pPr>
+            <a:r>
+              <a:t/>
+            </a:r>
+            <a:endParaRPr sz="900"/>
+          </a:p>
+        </p:txBody>
+      </p:sp>
+    </p:spTree>
+  </p:cSld>
+  <p:clrMapOvr>
+    <a:masterClrMapping/>
+  </p:clrMapOvr>
+</p:sld>
+</file>
+
+<file path=ppt/slides/slide3.xml><?xml version="1.0" encoding="utf-8"?>
+<p:sld xmlns:a="http://schemas.openxmlformats.org/drawingml/2006/main" xmlns:r="http://schemas.openxmlformats.org/officeDocument/2006/relationships" xmlns:mc="http://schemas.openxmlformats.org/markup-compatibility/2006" xmlns:mv="urn:schemas-microsoft-com:mac:vml" xmlns:p="http://schemas.openxmlformats.org/presentationml/2006/main" xmlns:c="http://schemas.openxmlformats.org/drawingml/2006/chart" xmlns:dgm="http://schemas.openxmlformats.org/drawingml/2006/diagram" xmlns:o="urn:schemas-microsoft-com:office:office" xmlns:v="urn:schemas-microsoft-com:vml" xmlns:pvml="urn:schemas-microsoft-com:office:powerpoint" xmlns:com="http://schemas.openxmlformats.org/drawingml/2006/compatibility" xmlns:p14="http://schemas.microsoft.com/office/powerpoint/2010/main" xmlns:p15="http://schemas.microsoft.com/office/powerpoint/2012/main" xmlns:ahyp="http://schemas.microsoft.com/office/drawing/2018/hyperlinkcolor">
+  <p:cSld>
+    <p:spTree>
+      <p:nvGrpSpPr>
+        <p:cNvPr id="290" name="Shape 290"/>
+        <p:cNvGrpSpPr/>
+        <p:nvPr/>
+      </p:nvGrpSpPr>
+      <p:grpSpPr>
+        <a:xfrm>
+          <a:off x="0" y="0"/>
+          <a:ext cx="0" cy="0"/>
+          <a:chOff x="0" y="0"/>
+          <a:chExt cx="0" cy="0"/>
+        </a:xfrm>
+      </p:grpSpPr>
+      <p:sp>
+        <p:nvSpPr>
+          <p:cNvPr id="291" name="Google Shape;291;p15"/>
+          <p:cNvSpPr txBox="1"/>
+          <p:nvPr>
+            <p:ph type="title"/>
+          </p:nvPr>
+        </p:nvSpPr>
+        <p:spPr>
+          <a:xfrm>
+            <a:off x="1303800" y="598575"/>
+            <a:ext cx="7030500" cy="999300"/>
+          </a:xfrm>
+          <a:prstGeom prst="rect">
+            <a:avLst/>
+          </a:prstGeom>
+        </p:spPr>
+        <p:txBody>
+          <a:bodyPr anchorCtr="0" anchor="t" bIns="91425" lIns="91425" spcFirstLastPara="1" rIns="91425" wrap="square" tIns="91425">
+            <a:noAutofit/>
+          </a:bodyPr>
+          <a:lstStyle/>
+          <a:p>
+            <a:pPr indent="0" lvl="0" marL="0" rtl="0" algn="l">
+              <a:spcBef>
+                <a:spcPts val="0"/>
+              </a:spcBef>
+              <a:spcAft>
+                <a:spcPts val="0"/>
+              </a:spcAft>
+              <a:buNone/>
+            </a:pPr>
+            <a:r>
+              <a:rPr lang="en" sz="3200"/>
+              <a:t>Finding our Source Code</a:t>
+            </a:r>
             <a:endParaRPr sz="3200"/>
           </a:p>
         </p:txBody>
       </p:sp>
       <p:sp>
         <p:nvSpPr>
-          <p:cNvPr id="284" name="Google Shape;284;p14"/>
+          <p:cNvPr id="292" name="Google Shape;292;p15"/>
           <p:cNvSpPr txBox="1"/>
           <p:nvPr>
             <p:ph idx="1" type="body"/>
@@ -16495,7 +17652,15 @@
             </a:pPr>
             <a:r>
               <a:rPr lang="en" sz="3000"/>
-              <a:t>Apertium</a:t>
+              <a:t>Apertium (</a:t>
+            </a:r>
+            <a:r>
+              <a:rPr lang="en" sz="3000"/>
+              <a:t>initial</a:t>
+            </a:r>
+            <a:r>
+              <a:rPr lang="en" sz="3000"/>
+              <a:t> choice)</a:t>
             </a:r>
             <a:endParaRPr sz="3000"/>
           </a:p>
@@ -16512,7 +17677,7 @@
             </a:pPr>
             <a:r>
               <a:rPr lang="en" sz="3000"/>
-              <a:t>Mars Map Maker</a:t>
+              <a:t>Mars Map Maker (final choice)</a:t>
             </a:r>
             <a:endParaRPr sz="3000"/>
           </a:p>
@@ -16520,7 +17685,7 @@
       </p:sp>
       <p:pic>
         <p:nvPicPr>
-          <p:cNvPr id="285" name="Google Shape;285;p14"/>
+          <p:cNvPr id="293" name="Google Shape;293;p15"/>
           <p:cNvPicPr preferRelativeResize="0"/>
           <p:nvPr/>
         </p:nvPicPr>
@@ -16553,12 +17718,12 @@
 </p:sld>
 </file>
 
-<file path=ppt/slides/slide3.xml><?xml version="1.0" encoding="utf-8"?>
+<file path=ppt/slides/slide4.xml><?xml version="1.0" encoding="utf-8"?>
 <p:sld xmlns:a="http://schemas.openxmlformats.org/drawingml/2006/main" xmlns:r="http://schemas.openxmlformats.org/officeDocument/2006/relationships" xmlns:mc="http://schemas.openxmlformats.org/markup-compatibility/2006" xmlns:mv="urn:schemas-microsoft-com:mac:vml" xmlns:p="http://schemas.openxmlformats.org/presentationml/2006/main" xmlns:c="http://schemas.openxmlformats.org/drawingml/2006/chart" xmlns:dgm="http://schemas.openxmlformats.org/drawingml/2006/diagram" xmlns:o="urn:schemas-microsoft-com:office:office" xmlns:v="urn:schemas-microsoft-com:vml" xmlns:pvml="urn:schemas-microsoft-com:office:powerpoint" xmlns:com="http://schemas.openxmlformats.org/drawingml/2006/compatibility" xmlns:p14="http://schemas.microsoft.com/office/powerpoint/2010/main" xmlns:p15="http://schemas.microsoft.com/office/powerpoint/2012/main" xmlns:ahyp="http://schemas.microsoft.com/office/drawing/2018/hyperlinkcolor">
   <p:cSld>
     <p:spTree>
       <p:nvGrpSpPr>
-        <p:cNvPr id="289" name="Shape 289"/>
+        <p:cNvPr id="297" name="Shape 297"/>
         <p:cNvGrpSpPr/>
         <p:nvPr/>
       </p:nvGrpSpPr>
@@ -16572,7 +17737,7 @@
       </p:grpSpPr>
       <p:sp>
         <p:nvSpPr>
-          <p:cNvPr id="290" name="Google Shape;290;p15"/>
+          <p:cNvPr id="298" name="Google Shape;298;p16"/>
           <p:cNvSpPr txBox="1"/>
           <p:nvPr>
             <p:ph type="title"/>
@@ -16612,7 +17777,7 @@
       </p:sp>
       <p:sp>
         <p:nvSpPr>
-          <p:cNvPr id="291" name="Google Shape;291;p15"/>
+          <p:cNvPr id="299" name="Google Shape;299;p16"/>
           <p:cNvSpPr txBox="1"/>
           <p:nvPr>
             <p:ph idx="1" type="body"/>
@@ -16730,12 +17895,12 @@
 </p:sld>
 </file>
 
-<file path=ppt/slides/slide4.xml><?xml version="1.0" encoding="utf-8"?>
+<file path=ppt/slides/slide5.xml><?xml version="1.0" encoding="utf-8"?>
 <p:sld xmlns:a="http://schemas.openxmlformats.org/drawingml/2006/main" xmlns:r="http://schemas.openxmlformats.org/officeDocument/2006/relationships" xmlns:mc="http://schemas.openxmlformats.org/markup-compatibility/2006" xmlns:mv="urn:schemas-microsoft-com:mac:vml" xmlns:p="http://schemas.openxmlformats.org/presentationml/2006/main" xmlns:c="http://schemas.openxmlformats.org/drawingml/2006/chart" xmlns:dgm="http://schemas.openxmlformats.org/drawingml/2006/diagram" xmlns:o="urn:schemas-microsoft-com:office:office" xmlns:v="urn:schemas-microsoft-com:vml" xmlns:pvml="urn:schemas-microsoft-com:office:powerpoint" xmlns:com="http://schemas.openxmlformats.org/drawingml/2006/compatibility" xmlns:p14="http://schemas.microsoft.com/office/powerpoint/2010/main" xmlns:p15="http://schemas.microsoft.com/office/powerpoint/2012/main" xmlns:ahyp="http://schemas.microsoft.com/office/drawing/2018/hyperlinkcolor">
   <p:cSld>
     <p:spTree>
       <p:nvGrpSpPr>
-        <p:cNvPr id="295" name="Shape 295"/>
+        <p:cNvPr id="303" name="Shape 303"/>
         <p:cNvGrpSpPr/>
         <p:nvPr/>
       </p:nvGrpSpPr>
@@ -16749,7 +17914,7 @@
       </p:grpSpPr>
       <p:sp>
         <p:nvSpPr>
-          <p:cNvPr id="296" name="Google Shape;296;p16"/>
+          <p:cNvPr id="304" name="Google Shape;304;p17"/>
           <p:cNvSpPr txBox="1"/>
           <p:nvPr>
             <p:ph type="title"/>
@@ -16789,7 +17954,7 @@
       </p:sp>
       <p:sp>
         <p:nvSpPr>
-          <p:cNvPr id="297" name="Google Shape;297;p16"/>
+          <p:cNvPr id="305" name="Google Shape;305;p17"/>
           <p:cNvSpPr txBox="1"/>
           <p:nvPr>
             <p:ph idx="1" type="body"/>
@@ -16797,8 +17962,8 @@
         </p:nvSpPr>
         <p:spPr>
           <a:xfrm>
-            <a:off x="1303800" y="1467575"/>
-            <a:ext cx="7030500" cy="2671800"/>
+            <a:off x="1303800" y="1474650"/>
+            <a:ext cx="7030500" cy="3534300"/>
           </a:xfrm>
           <a:prstGeom prst="rect">
             <a:avLst/>
@@ -16823,7 +17988,7 @@
               <a:buNone/>
             </a:pPr>
             <a:r>
-              <a:rPr b="1" lang="en" sz="1400">
+              <a:rPr b="1" lang="en" sz="1200">
                 <a:solidFill>
                   <a:srgbClr val="000000"/>
                 </a:solidFill>
@@ -16835,7 +18000,7 @@
               <a:t>Step 1:</a:t>
             </a:r>
             <a:r>
-              <a:rPr lang="en" sz="1400">
+              <a:rPr lang="en" sz="1200">
                 <a:solidFill>
                   <a:srgbClr val="000000"/>
                 </a:solidFill>
@@ -16844,9 +18009,9 @@
                 <a:cs typeface="Proxima Nova"/>
                 <a:sym typeface="Proxima Nova"/>
               </a:rPr>
-              <a:t> Clone the repository "git clone https://github.com/csci-362-01-2020/Best-Team"</a:t>
+              <a:t> Run on Ubuntu Focal Fossa 20.04</a:t>
             </a:r>
-            <a:endParaRPr sz="1400">
+            <a:endParaRPr sz="1200">
               <a:solidFill>
                 <a:srgbClr val="000000"/>
               </a:solidFill>
@@ -16870,7 +18035,7 @@
               <a:buNone/>
             </a:pPr>
             <a:r>
-              <a:rPr b="1" lang="en" sz="1400">
+              <a:rPr b="1" lang="en" sz="1200">
                 <a:solidFill>
                   <a:srgbClr val="000000"/>
                 </a:solidFill>
@@ -16882,7 +18047,7 @@
               <a:t>Step 2:</a:t>
             </a:r>
             <a:r>
-              <a:rPr lang="en" sz="1400">
+              <a:rPr lang="en" sz="1200">
                 <a:solidFill>
                   <a:srgbClr val="000000"/>
                 </a:solidFill>
@@ -16891,9 +18056,9 @@
                 <a:cs typeface="Proxima Nova"/>
                 <a:sym typeface="Proxima Nova"/>
               </a:rPr>
-              <a:t> Move into the TestAutomation/MarsMapMaker/ and run the command "git submodule update --init"</a:t>
+              <a:t> Install git “sudo apt install git -y”</a:t>
             </a:r>
-            <a:endParaRPr sz="1400">
+            <a:endParaRPr sz="1200">
               <a:solidFill>
                 <a:srgbClr val="000000"/>
               </a:solidFill>
@@ -16917,7 +18082,7 @@
               <a:buNone/>
             </a:pPr>
             <a:r>
-              <a:rPr b="1" lang="en" sz="1400">
+              <a:rPr b="1" lang="en" sz="1200">
                 <a:solidFill>
                   <a:srgbClr val="000000"/>
                 </a:solidFill>
@@ -16926,10 +18091,10 @@
                 <a:cs typeface="Proxima Nova"/>
                 <a:sym typeface="Proxima Nova"/>
               </a:rPr>
-              <a:t>Step 3: </a:t>
+              <a:t>Step 3:</a:t>
             </a:r>
             <a:r>
-              <a:rPr lang="en" sz="1400">
+              <a:rPr lang="en" sz="1200">
                 <a:solidFill>
                   <a:srgbClr val="000000"/>
                 </a:solidFill>
@@ -16938,9 +18103,46 @@
                 <a:cs typeface="Proxima Nova"/>
                 <a:sym typeface="Proxima Nova"/>
               </a:rPr>
-              <a:t>In the same directory, run command "git pull https://github.com/hafey1/MarsMapMaker"</a:t>
+              <a:t> Clone repository </a:t>
             </a:r>
-            <a:endParaRPr sz="1400">
+            <a:r>
+              <a:rPr lang="en" sz="1200">
+                <a:solidFill>
+                  <a:srgbClr val="000000"/>
+                </a:solidFill>
+                <a:latin typeface="Proxima Nova"/>
+                <a:ea typeface="Proxima Nova"/>
+                <a:cs typeface="Proxima Nova"/>
+                <a:sym typeface="Proxima Nova"/>
+              </a:rPr>
+              <a:t>"git clone </a:t>
+            </a:r>
+            <a:r>
+              <a:rPr lang="en" sz="1200" u="sng">
+                <a:solidFill>
+                  <a:schemeClr val="hlink"/>
+                </a:solidFill>
+                <a:latin typeface="Proxima Nova"/>
+                <a:ea typeface="Proxima Nova"/>
+                <a:cs typeface="Proxima Nova"/>
+                <a:sym typeface="Proxima Nova"/>
+                <a:hlinkClick r:id="rId3"/>
+              </a:rPr>
+              <a:t>https://github.com/csci-362-01-2020/Best-Team</a:t>
+            </a:r>
+            <a:r>
+              <a:rPr lang="en" sz="1200">
+                <a:solidFill>
+                  <a:srgbClr val="000000"/>
+                </a:solidFill>
+                <a:latin typeface="Proxima Nova"/>
+                <a:ea typeface="Proxima Nova"/>
+                <a:cs typeface="Proxima Nova"/>
+                <a:sym typeface="Proxima Nova"/>
+              </a:rPr>
+              <a:t>"</a:t>
+            </a:r>
+            <a:endParaRPr sz="1200">
               <a:solidFill>
                 <a:srgbClr val="000000"/>
               </a:solidFill>
@@ -16964,7 +18166,7 @@
               <a:buNone/>
             </a:pPr>
             <a:r>
-              <a:rPr b="1" lang="en" sz="1400">
+              <a:rPr b="1" lang="en" sz="1200">
                 <a:solidFill>
                   <a:srgbClr val="000000"/>
                 </a:solidFill>
@@ -16973,10 +18175,10 @@
                 <a:cs typeface="Proxima Nova"/>
                 <a:sym typeface="Proxima Nova"/>
               </a:rPr>
-              <a:t>Step 4: </a:t>
+              <a:t>Step 4:</a:t>
             </a:r>
             <a:r>
-              <a:rPr lang="en" sz="1400">
+              <a:rPr lang="en" sz="1200">
                 <a:solidFill>
                   <a:srgbClr val="000000"/>
                 </a:solidFill>
@@ -16985,9 +18187,9 @@
                 <a:cs typeface="Proxima Nova"/>
                 <a:sym typeface="Proxima Nova"/>
               </a:rPr>
-              <a:t>Install npm "npm install"</a:t>
+              <a:t> Move into the TestAutomation directory</a:t>
             </a:r>
-            <a:endParaRPr sz="1400">
+            <a:endParaRPr sz="1200">
               <a:solidFill>
                 <a:srgbClr val="000000"/>
               </a:solidFill>
@@ -17011,7 +18213,7 @@
               <a:buNone/>
             </a:pPr>
             <a:r>
-              <a:rPr b="1" lang="en" sz="1400">
+              <a:rPr b="1" lang="en" sz="1200">
                 <a:solidFill>
                   <a:srgbClr val="000000"/>
                 </a:solidFill>
@@ -17020,10 +18222,10 @@
                 <a:cs typeface="Proxima Nova"/>
                 <a:sym typeface="Proxima Nova"/>
               </a:rPr>
-              <a:t>Step 5: </a:t>
+              <a:t>Step 5:</a:t>
             </a:r>
             <a:r>
-              <a:rPr lang="en" sz="1400">
+              <a:rPr lang="en" sz="1200">
                 <a:solidFill>
                   <a:srgbClr val="000000"/>
                 </a:solidFill>
@@ -17032,9 +18234,9 @@
                 <a:cs typeface="Proxima Nova"/>
                 <a:sym typeface="Proxima Nova"/>
               </a:rPr>
-              <a:t>Once install is complete, change to the scripts directory and run the quickSetUp.sh script (bash quickSetUp.sh)</a:t>
+              <a:t> run quickSetUp.sh (this installs all our dependencies)</a:t>
             </a:r>
-            <a:endParaRPr sz="1400">
+            <a:endParaRPr sz="1200">
               <a:solidFill>
                 <a:srgbClr val="000000"/>
               </a:solidFill>
@@ -17058,7 +18260,7 @@
               <a:buNone/>
             </a:pPr>
             <a:r>
-              <a:rPr b="1" lang="en" sz="1400">
+              <a:rPr b="1" lang="en" sz="1200">
                 <a:solidFill>
                   <a:srgbClr val="000000"/>
                 </a:solidFill>
@@ -17067,10 +18269,10 @@
                 <a:cs typeface="Proxima Nova"/>
                 <a:sym typeface="Proxima Nova"/>
               </a:rPr>
-              <a:t>Step 6: </a:t>
+              <a:t>Step 6:</a:t>
             </a:r>
             <a:r>
-              <a:rPr lang="en" sz="1400">
+              <a:rPr lang="en" sz="1200">
                 <a:solidFill>
                   <a:srgbClr val="000000"/>
                 </a:solidFill>
@@ -17079,9 +18281,146 @@
                 <a:cs typeface="Proxima Nova"/>
                 <a:sym typeface="Proxima Nova"/>
               </a:rPr>
-              <a:t>Once the quick setup is complete, run the runAllTests.sh script (bash runAllTests.sh)</a:t>
+              <a:t> run runAllTests.sh </a:t>
             </a:r>
-            <a:endParaRPr sz="1600"/>
+            <a:endParaRPr sz="1200">
+              <a:solidFill>
+                <a:srgbClr val="000000"/>
+              </a:solidFill>
+              <a:latin typeface="Proxima Nova"/>
+              <a:ea typeface="Proxima Nova"/>
+              <a:cs typeface="Proxima Nova"/>
+              <a:sym typeface="Proxima Nova"/>
+            </a:endParaRPr>
+          </a:p>
+          <a:p>
+            <a:pPr indent="0" lvl="0" marL="0" rtl="0" algn="l">
+              <a:lnSpc>
+                <a:spcPct val="125000"/>
+              </a:lnSpc>
+              <a:spcBef>
+                <a:spcPts val="1000"/>
+              </a:spcBef>
+              <a:spcAft>
+                <a:spcPts val="0"/>
+              </a:spcAft>
+              <a:buNone/>
+            </a:pPr>
+            <a:r>
+              <a:rPr i="1" lang="en" sz="1200">
+                <a:solidFill>
+                  <a:srgbClr val="000000"/>
+                </a:solidFill>
+                <a:latin typeface="Proxima Nova"/>
+                <a:ea typeface="Proxima Nova"/>
+                <a:cs typeface="Proxima Nova"/>
+                <a:sym typeface="Proxima Nova"/>
+              </a:rPr>
+              <a:t>(Follow next steps to access/run tests on faulted code) </a:t>
+            </a:r>
+            <a:endParaRPr i="1" sz="1200">
+              <a:solidFill>
+                <a:srgbClr val="000000"/>
+              </a:solidFill>
+              <a:latin typeface="Proxima Nova"/>
+              <a:ea typeface="Proxima Nova"/>
+              <a:cs typeface="Proxima Nova"/>
+              <a:sym typeface="Proxima Nova"/>
+            </a:endParaRPr>
+          </a:p>
+          <a:p>
+            <a:pPr indent="0" lvl="0" marL="0" rtl="0" algn="l">
+              <a:lnSpc>
+                <a:spcPct val="125000"/>
+              </a:lnSpc>
+              <a:spcBef>
+                <a:spcPts val="1000"/>
+              </a:spcBef>
+              <a:spcAft>
+                <a:spcPts val="0"/>
+              </a:spcAft>
+              <a:buNone/>
+            </a:pPr>
+            <a:r>
+              <a:rPr b="1" lang="en" sz="1200">
+                <a:solidFill>
+                  <a:srgbClr val="000000"/>
+                </a:solidFill>
+                <a:latin typeface="Proxima Nova"/>
+                <a:ea typeface="Proxima Nova"/>
+                <a:cs typeface="Proxima Nova"/>
+                <a:sym typeface="Proxima Nova"/>
+              </a:rPr>
+              <a:t>Step 7:</a:t>
+            </a:r>
+            <a:r>
+              <a:rPr lang="en" sz="1200">
+                <a:solidFill>
+                  <a:srgbClr val="000000"/>
+                </a:solidFill>
+                <a:latin typeface="Proxima Nova"/>
+                <a:ea typeface="Proxima Nova"/>
+                <a:cs typeface="Proxima Nova"/>
+                <a:sym typeface="Proxima Nova"/>
+              </a:rPr>
+              <a:t> Checkout our mutation branch “git checkout mutationBranch”</a:t>
+            </a:r>
+            <a:endParaRPr sz="1200">
+              <a:solidFill>
+                <a:srgbClr val="000000"/>
+              </a:solidFill>
+              <a:latin typeface="Proxima Nova"/>
+              <a:ea typeface="Proxima Nova"/>
+              <a:cs typeface="Proxima Nova"/>
+              <a:sym typeface="Proxima Nova"/>
+            </a:endParaRPr>
+          </a:p>
+          <a:p>
+            <a:pPr indent="0" lvl="0" marL="0" rtl="0" algn="l">
+              <a:lnSpc>
+                <a:spcPct val="125000"/>
+              </a:lnSpc>
+              <a:spcBef>
+                <a:spcPts val="1000"/>
+              </a:spcBef>
+              <a:spcAft>
+                <a:spcPts val="0"/>
+              </a:spcAft>
+              <a:buNone/>
+            </a:pPr>
+            <a:r>
+              <a:rPr b="1" lang="en" sz="1200">
+                <a:solidFill>
+                  <a:srgbClr val="000000"/>
+                </a:solidFill>
+                <a:latin typeface="Proxima Nova"/>
+                <a:ea typeface="Proxima Nova"/>
+                <a:cs typeface="Proxima Nova"/>
+                <a:sym typeface="Proxima Nova"/>
+              </a:rPr>
+              <a:t>Step 8:</a:t>
+            </a:r>
+            <a:r>
+              <a:rPr lang="en" sz="1200">
+                <a:solidFill>
+                  <a:srgbClr val="000000"/>
+                </a:solidFill>
+                <a:latin typeface="Proxima Nova"/>
+                <a:ea typeface="Proxima Nova"/>
+                <a:cs typeface="Proxima Nova"/>
+                <a:sym typeface="Proxima Nova"/>
+              </a:rPr>
+              <a:t> run runAllTests.sh (mutated code can be found in the project directory while on this branch)</a:t>
+            </a:r>
+            <a:endParaRPr sz="1200">
+              <a:solidFill>
+                <a:srgbClr val="000000"/>
+              </a:solidFill>
+              <a:latin typeface="Proxima Nova"/>
+              <a:ea typeface="Proxima Nova"/>
+              <a:cs typeface="Proxima Nova"/>
+              <a:sym typeface="Proxima Nova"/>
+            </a:endParaRPr>
           </a:p>
         </p:txBody>
       </p:sp>
@@ -17093,12 +18432,12 @@
 </p:sld>
 </file>
 
-<file path=ppt/slides/slide5.xml><?xml version="1.0" encoding="utf-8"?>
+<file path=ppt/slides/slide6.xml><?xml version="1.0" encoding="utf-8"?>
 <p:sld xmlns:a="http://schemas.openxmlformats.org/drawingml/2006/main" xmlns:r="http://schemas.openxmlformats.org/officeDocument/2006/relationships" xmlns:mc="http://schemas.openxmlformats.org/markup-compatibility/2006" xmlns:mv="urn:schemas-microsoft-com:mac:vml" xmlns:p="http://schemas.openxmlformats.org/presentationml/2006/main" xmlns:c="http://schemas.openxmlformats.org/drawingml/2006/chart" xmlns:dgm="http://schemas.openxmlformats.org/drawingml/2006/diagram" xmlns:o="urn:schemas-microsoft-com:office:office" xmlns:v="urn:schemas-microsoft-com:vml" xmlns:pvml="urn:schemas-microsoft-com:office:powerpoint" xmlns:com="http://schemas.openxmlformats.org/drawingml/2006/compatibility" xmlns:p14="http://schemas.microsoft.com/office/powerpoint/2010/main" xmlns:p15="http://schemas.microsoft.com/office/powerpoint/2012/main" xmlns:ahyp="http://schemas.microsoft.com/office/drawing/2018/hyperlinkcolor">
   <p:cSld>
     <p:spTree>
       <p:nvGrpSpPr>
-        <p:cNvPr id="301" name="Shape 301"/>
+        <p:cNvPr id="309" name="Shape 309"/>
         <p:cNvGrpSpPr/>
         <p:nvPr/>
       </p:nvGrpSpPr>
@@ -17112,7 +18451,7 @@
       </p:grpSpPr>
       <p:sp>
         <p:nvSpPr>
-          <p:cNvPr id="302" name="Google Shape;302;p17"/>
+          <p:cNvPr id="310" name="Google Shape;310;p18"/>
           <p:cNvSpPr txBox="1"/>
           <p:nvPr>
             <p:ph type="title"/>
@@ -17152,7 +18491,7 @@
       </p:sp>
       <p:sp>
         <p:nvSpPr>
-          <p:cNvPr id="303" name="Google Shape;303;p17"/>
+          <p:cNvPr id="311" name="Google Shape;311;p18"/>
           <p:cNvSpPr txBox="1"/>
           <p:nvPr>
             <p:ph idx="1" type="body"/>
@@ -17250,12 +18589,12 @@
 </p:sld>
 </file>
 
-<file path=ppt/slides/slide6.xml><?xml version="1.0" encoding="utf-8"?>
+<file path=ppt/slides/slide7.xml><?xml version="1.0" encoding="utf-8"?>
 <p:sld xmlns:a="http://schemas.openxmlformats.org/drawingml/2006/main" xmlns:r="http://schemas.openxmlformats.org/officeDocument/2006/relationships" xmlns:mc="http://schemas.openxmlformats.org/markup-compatibility/2006" xmlns:mv="urn:schemas-microsoft-com:mac:vml" xmlns:p="http://schemas.openxmlformats.org/presentationml/2006/main" xmlns:c="http://schemas.openxmlformats.org/drawingml/2006/chart" xmlns:dgm="http://schemas.openxmlformats.org/drawingml/2006/diagram" xmlns:o="urn:schemas-microsoft-com:office:office" xmlns:v="urn:schemas-microsoft-com:vml" xmlns:pvml="urn:schemas-microsoft-com:office:powerpoint" xmlns:com="http://schemas.openxmlformats.org/drawingml/2006/compatibility" xmlns:p14="http://schemas.microsoft.com/office/powerpoint/2010/main" xmlns:p15="http://schemas.microsoft.com/office/powerpoint/2012/main" xmlns:ahyp="http://schemas.microsoft.com/office/drawing/2018/hyperlinkcolor">
   <p:cSld>
     <p:spTree>
       <p:nvGrpSpPr>
-        <p:cNvPr id="307" name="Shape 307"/>
+        <p:cNvPr id="315" name="Shape 315"/>
         <p:cNvGrpSpPr/>
         <p:nvPr/>
       </p:nvGrpSpPr>
@@ -17269,7 +18608,7 @@
       </p:grpSpPr>
       <p:pic>
         <p:nvPicPr>
-          <p:cNvPr id="308" name="Google Shape;308;p18"/>
+          <p:cNvPr id="316" name="Google Shape;316;p19"/>
           <p:cNvPicPr preferRelativeResize="0"/>
           <p:nvPr/>
         </p:nvPicPr>
@@ -17303,12 +18642,12 @@
 </p:sld>
 </file>
 
-<file path=ppt/slides/slide7.xml><?xml version="1.0" encoding="utf-8"?>
+<file path=ppt/slides/slide8.xml><?xml version="1.0" encoding="utf-8"?>
 <p:sld xmlns:a="http://schemas.openxmlformats.org/drawingml/2006/main" xmlns:r="http://schemas.openxmlformats.org/officeDocument/2006/relationships" xmlns:mc="http://schemas.openxmlformats.org/markup-compatibility/2006" xmlns:mv="urn:schemas-microsoft-com:mac:vml" xmlns:p="http://schemas.openxmlformats.org/presentationml/2006/main" xmlns:c="http://schemas.openxmlformats.org/drawingml/2006/chart" xmlns:dgm="http://schemas.openxmlformats.org/drawingml/2006/diagram" xmlns:o="urn:schemas-microsoft-com:office:office" xmlns:v="urn:schemas-microsoft-com:vml" xmlns:pvml="urn:schemas-microsoft-com:office:powerpoint" xmlns:com="http://schemas.openxmlformats.org/drawingml/2006/compatibility" xmlns:p14="http://schemas.microsoft.com/office/powerpoint/2010/main" xmlns:p15="http://schemas.microsoft.com/office/powerpoint/2012/main" xmlns:ahyp="http://schemas.microsoft.com/office/drawing/2018/hyperlinkcolor">
   <p:cSld>
     <p:spTree>
       <p:nvGrpSpPr>
-        <p:cNvPr id="312" name="Shape 312"/>
+        <p:cNvPr id="320" name="Shape 320"/>
         <p:cNvGrpSpPr/>
         <p:nvPr/>
       </p:nvGrpSpPr>
@@ -17322,7 +18661,7 @@
       </p:grpSpPr>
       <p:sp>
         <p:nvSpPr>
-          <p:cNvPr id="313" name="Google Shape;313;p19"/>
+          <p:cNvPr id="321" name="Google Shape;321;p20"/>
           <p:cNvSpPr txBox="1"/>
           <p:nvPr>
             <p:ph type="title"/>
@@ -17362,7 +18701,7 @@
       </p:sp>
       <p:sp>
         <p:nvSpPr>
-          <p:cNvPr id="314" name="Google Shape;314;p19"/>
+          <p:cNvPr id="322" name="Google Shape;322;p20"/>
           <p:cNvSpPr txBox="1"/>
           <p:nvPr>
             <p:ph idx="1" type="body"/>
@@ -17393,10 +18732,10 @@
               <a:buNone/>
             </a:pPr>
             <a:r>
-              <a:rPr lang="en"/>
+              <a:rPr lang="en" sz="1100"/>
               <a:t>"module": "DropDown", // chooses the module from which the tested function is retrieved</a:t>
             </a:r>
-            <a:endParaRPr/>
+            <a:endParaRPr sz="1100"/>
           </a:p>
           <a:p>
             <a:pPr indent="0" lvl="0" marL="0" rtl="0" algn="l">
@@ -17409,10 +18748,10 @@
               <a:buNone/>
             </a:pPr>
             <a:r>
-              <a:rPr lang="en"/>
+              <a:rPr lang="en" sz="1100"/>
               <a:t>"ID": 1, // sets the test case ID</a:t>
             </a:r>
-            <a:endParaRPr/>
+            <a:endParaRPr sz="1100"/>
           </a:p>
           <a:p>
             <a:pPr indent="0" lvl="0" marL="0" rtl="0" algn="l">
@@ -17425,10 +18764,10 @@
               <a:buNone/>
             </a:pPr>
             <a:r>
-              <a:rPr lang="en"/>
+              <a:rPr lang="en" sz="1100"/>
               <a:t>"functionName": "entWithContent", // chooses which function from the module to test</a:t>
             </a:r>
-            <a:endParaRPr/>
+            <a:endParaRPr sz="1100"/>
           </a:p>
           <a:p>
             <a:pPr indent="0" lvl="0" marL="0" rtl="0" algn="l">
@@ -17441,10 +18780,10 @@
               <a:buNone/>
             </a:pPr>
             <a:r>
-              <a:rPr lang="en"/>
-              <a:t>"metaData": "Must take in an array of objects and return the last index that contains non empty strings that are present with the key \"value\" or return -1", // short description of expected inputs and expected outputs</a:t>
+              <a:rPr lang="en" sz="1100"/>
+              <a:t>"metaData": "Must take in an array of objects and return the last index that contains non empty strings that are present with the key "value" or return -1", // short description of expected inputs and expected outputs</a:t>
             </a:r>
-            <a:endParaRPr/>
+            <a:endParaRPr sz="1100"/>
           </a:p>
           <a:p>
             <a:pPr indent="0" lvl="0" marL="0" rtl="0" algn="l">
@@ -17457,10 +18796,10 @@
               <a:buNone/>
             </a:pPr>
             <a:r>
-              <a:rPr lang="en"/>
+              <a:rPr lang="en" sz="1100"/>
               <a:t>"metaDataShort": "DropDown.entWithContent(input) must return -1", // precise expectations of this test case</a:t>
             </a:r>
-            <a:endParaRPr/>
+            <a:endParaRPr sz="1100"/>
           </a:p>
           <a:p>
             <a:pPr indent="0" lvl="0" marL="0" rtl="0" algn="l">
@@ -17473,10 +18812,10 @@
               <a:buNone/>
             </a:pPr>
             <a:r>
-              <a:rPr lang="en"/>
+              <a:rPr lang="en" sz="1100"/>
               <a:t>"input": [], // input for the function to test functionality described above</a:t>
             </a:r>
-            <a:endParaRPr/>
+            <a:endParaRPr sz="1100"/>
           </a:p>
           <a:p>
             <a:pPr indent="0" lvl="0" marL="0" rtl="0" algn="l">
@@ -17489,10 +18828,10 @@
               <a:buNone/>
             </a:pPr>
             <a:r>
-              <a:rPr lang="en"/>
+              <a:rPr lang="en" sz="1100"/>
               <a:t>"expectedOutput": -1 // expected output of the function with given input</a:t>
             </a:r>
-            <a:endParaRPr/>
+            <a:endParaRPr sz="1100"/>
           </a:p>
           <a:p>
             <a:pPr indent="0" lvl="0" marL="0" rtl="0" algn="l">
@@ -17519,12 +18858,12 @@
 </p:sld>
 </file>
 
-<file path=ppt/slides/slide8.xml><?xml version="1.0" encoding="utf-8"?>
+<file path=ppt/slides/slide9.xml><?xml version="1.0" encoding="utf-8"?>
 <p:sld xmlns:a="http://schemas.openxmlformats.org/drawingml/2006/main" xmlns:r="http://schemas.openxmlformats.org/officeDocument/2006/relationships" xmlns:mc="http://schemas.openxmlformats.org/markup-compatibility/2006" xmlns:mv="urn:schemas-microsoft-com:mac:vml" xmlns:p="http://schemas.openxmlformats.org/presentationml/2006/main" xmlns:c="http://schemas.openxmlformats.org/drawingml/2006/chart" xmlns:dgm="http://schemas.openxmlformats.org/drawingml/2006/diagram" xmlns:o="urn:schemas-microsoft-com:office:office" xmlns:v="urn:schemas-microsoft-com:vml" xmlns:pvml="urn:schemas-microsoft-com:office:powerpoint" xmlns:com="http://schemas.openxmlformats.org/drawingml/2006/compatibility" xmlns:p14="http://schemas.microsoft.com/office/powerpoint/2010/main" xmlns:p15="http://schemas.microsoft.com/office/powerpoint/2012/main" xmlns:ahyp="http://schemas.microsoft.com/office/drawing/2018/hyperlinkcolor">
   <p:cSld>
     <p:spTree>
       <p:nvGrpSpPr>
-        <p:cNvPr id="318" name="Shape 318"/>
+        <p:cNvPr id="326" name="Shape 326"/>
         <p:cNvGrpSpPr/>
         <p:nvPr/>
       </p:nvGrpSpPr>
@@ -17538,7 +18877,7 @@
       </p:grpSpPr>
       <p:sp>
         <p:nvSpPr>
-          <p:cNvPr id="319" name="Google Shape;319;p20"/>
+          <p:cNvPr id="327" name="Google Shape;327;p21"/>
           <p:cNvSpPr txBox="1"/>
           <p:nvPr>
             <p:ph type="title"/>
@@ -17573,146 +18912,6 @@
               <a:t>Testing Framework in Action</a:t>
             </a:r>
             <a:endParaRPr sz="4100"/>
-          </a:p>
-        </p:txBody>
-      </p:sp>
-    </p:spTree>
-  </p:cSld>
-  <p:clrMapOvr>
-    <a:masterClrMapping/>
-  </p:clrMapOvr>
-</p:sld>
-</file>
-
-<file path=ppt/slides/slide9.xml><?xml version="1.0" encoding="utf-8"?>
-<p:sld xmlns:a="http://schemas.openxmlformats.org/drawingml/2006/main" xmlns:r="http://schemas.openxmlformats.org/officeDocument/2006/relationships" xmlns:mc="http://schemas.openxmlformats.org/markup-compatibility/2006" xmlns:mv="urn:schemas-microsoft-com:mac:vml" xmlns:p="http://schemas.openxmlformats.org/presentationml/2006/main" xmlns:c="http://schemas.openxmlformats.org/drawingml/2006/chart" xmlns:dgm="http://schemas.openxmlformats.org/drawingml/2006/diagram" xmlns:o="urn:schemas-microsoft-com:office:office" xmlns:v="urn:schemas-microsoft-com:vml" xmlns:pvml="urn:schemas-microsoft-com:office:powerpoint" xmlns:com="http://schemas.openxmlformats.org/drawingml/2006/compatibility" xmlns:p14="http://schemas.microsoft.com/office/powerpoint/2010/main" xmlns:p15="http://schemas.microsoft.com/office/powerpoint/2012/main" xmlns:ahyp="http://schemas.microsoft.com/office/drawing/2018/hyperlinkcolor">
-  <p:cSld>
-    <p:spTree>
-      <p:nvGrpSpPr>
-        <p:cNvPr id="323" name="Shape 323"/>
-        <p:cNvGrpSpPr/>
-        <p:nvPr/>
-      </p:nvGrpSpPr>
-      <p:grpSpPr>
-        <a:xfrm>
-          <a:off x="0" y="0"/>
-          <a:ext cx="0" cy="0"/>
-          <a:chOff x="0" y="0"/>
-          <a:chExt cx="0" cy="0"/>
-        </a:xfrm>
-      </p:grpSpPr>
-      <p:sp>
-        <p:nvSpPr>
-          <p:cNvPr id="324" name="Google Shape;324;p21"/>
-          <p:cNvSpPr txBox="1"/>
-          <p:nvPr>
-            <p:ph type="title"/>
-          </p:nvPr>
-        </p:nvSpPr>
-        <p:spPr>
-          <a:xfrm>
-            <a:off x="1303800" y="598575"/>
-            <a:ext cx="7030500" cy="999300"/>
-          </a:xfrm>
-          <a:prstGeom prst="rect">
-            <a:avLst/>
-          </a:prstGeom>
-        </p:spPr>
-        <p:txBody>
-          <a:bodyPr anchorCtr="0" anchor="t" bIns="91425" lIns="91425" spcFirstLastPara="1" rIns="91425" wrap="square" tIns="91425">
-            <a:noAutofit/>
-          </a:bodyPr>
-          <a:lstStyle/>
-          <a:p>
-            <a:pPr indent="0" lvl="0" marL="0" rtl="0" algn="l">
-              <a:spcBef>
-                <a:spcPts val="0"/>
-              </a:spcBef>
-              <a:spcAft>
-                <a:spcPts val="0"/>
-              </a:spcAft>
-              <a:buNone/>
-            </a:pPr>
-            <a:r>
-              <a:rPr lang="en"/>
-              <a:t>Fault Injections</a:t>
-            </a:r>
-            <a:endParaRPr/>
-          </a:p>
-        </p:txBody>
-      </p:sp>
-      <p:sp>
-        <p:nvSpPr>
-          <p:cNvPr id="325" name="Google Shape;325;p21"/>
-          <p:cNvSpPr txBox="1"/>
-          <p:nvPr>
-            <p:ph idx="1" type="body"/>
-          </p:nvPr>
-        </p:nvSpPr>
-        <p:spPr>
-          <a:xfrm>
-            <a:off x="1303800" y="1990050"/>
-            <a:ext cx="7030500" cy="2541600"/>
-          </a:xfrm>
-          <a:prstGeom prst="rect">
-            <a:avLst/>
-          </a:prstGeom>
-        </p:spPr>
-        <p:txBody>
-          <a:bodyPr anchorCtr="0" anchor="t" bIns="91425" lIns="91425" spcFirstLastPara="1" rIns="91425" wrap="square" tIns="91425">
-            <a:noAutofit/>
-          </a:bodyPr>
-          <a:lstStyle/>
-          <a:p>
-            <a:pPr indent="-387350" lvl="0" marL="457200" rtl="0" algn="l">
-              <a:spcBef>
-                <a:spcPts val="0"/>
-              </a:spcBef>
-              <a:spcAft>
-                <a:spcPts val="0"/>
-              </a:spcAft>
-              <a:buSzPts val="2500"/>
-              <a:buChar char="-"/>
-            </a:pPr>
-            <a:r>
-              <a:rPr lang="en" sz="2500"/>
-              <a:t>Testing the tests</a:t>
-            </a:r>
-            <a:endParaRPr sz="2500"/>
-          </a:p>
-          <a:p>
-            <a:pPr indent="-387350" lvl="0" marL="457200" rtl="0" algn="l">
-              <a:spcBef>
-                <a:spcPts val="0"/>
-              </a:spcBef>
-              <a:spcAft>
-                <a:spcPts val="0"/>
-              </a:spcAft>
-              <a:buSzPts val="2500"/>
-              <a:buChar char="-"/>
-            </a:pPr>
-            <a:r>
-              <a:rPr lang="en" sz="2500"/>
-              <a:t>Necessary to demonstrate integrity</a:t>
-            </a:r>
-            <a:endParaRPr sz="2500"/>
-          </a:p>
-          <a:p>
-            <a:pPr indent="-387350" lvl="0" marL="457200" rtl="0" algn="l">
-              <a:spcBef>
-                <a:spcPts val="0"/>
-              </a:spcBef>
-              <a:spcAft>
-                <a:spcPts val="0"/>
-              </a:spcAft>
-              <a:buSzPts val="2500"/>
-              <a:buChar char="-"/>
-            </a:pPr>
-            <a:r>
-              <a:rPr lang="en" sz="2500"/>
-              <a:t>Catches more bugs</a:t>
-            </a:r>
-            <a:endParaRPr sz="2500"/>
           </a:p>
         </p:txBody>
       </p:sp>

</xml_diff>